<commit_message>
Started working on methods and changed the current status. Also worked on presentation and added vendors and images of SOC, SIEM and SOAR
</commit_message>
<xml_diff>
--- a/kochanek_ndr_prezentace.pptx
+++ b/kochanek_ndr_prezentace.pptx
@@ -10,27 +10,28 @@
     <p:sldId id="261" r:id="rId4"/>
     <p:sldId id="262" r:id="rId5"/>
     <p:sldId id="274" r:id="rId6"/>
-    <p:sldId id="266" r:id="rId7"/>
-    <p:sldId id="271" r:id="rId8"/>
-    <p:sldId id="268" r:id="rId9"/>
+    <p:sldId id="276" r:id="rId7"/>
+    <p:sldId id="266" r:id="rId8"/>
+    <p:sldId id="271" r:id="rId9"/>
     <p:sldId id="272" r:id="rId10"/>
     <p:sldId id="267" r:id="rId11"/>
     <p:sldId id="263" r:id="rId12"/>
     <p:sldId id="265" r:id="rId13"/>
+    <p:sldId id="275" r:id="rId14"/>
   </p:sldIdLst>
   <p:sldSz cx="9144000" cy="6858000" type="screen4x3"/>
   <p:notesSz cx="6858000" cy="9144000"/>
   <p:embeddedFontLst>
     <p:embeddedFont>
       <p:font typeface="Technika" panose="020B0604020202020204" charset="0"/>
-      <p:regular r:id="rId14"/>
-      <p:bold r:id="rId15"/>
-      <p:italic r:id="rId16"/>
-      <p:boldItalic r:id="rId17"/>
+      <p:regular r:id="rId15"/>
+      <p:bold r:id="rId16"/>
+      <p:italic r:id="rId17"/>
+      <p:boldItalic r:id="rId18"/>
     </p:embeddedFont>
     <p:embeddedFont>
       <p:font typeface="Technika-Bold" panose="00000600000000000000" charset="0"/>
-      <p:regular r:id="rId18"/>
+      <p:regular r:id="rId19"/>
     </p:embeddedFont>
   </p:embeddedFontLst>
   <p:defaultTextStyle>
@@ -1371,8 +1372,8 @@
         </p:nvSpPr>
         <p:spPr>
           <a:xfrm>
-            <a:off x="2189709" y="574882"/>
-            <a:ext cx="7736694" cy="1446663"/>
+            <a:off x="478355" y="1287947"/>
+            <a:ext cx="9076706" cy="1446663"/>
           </a:xfrm>
         </p:spPr>
         <p:txBody>
@@ -1455,7 +1456,12 @@
             <p:ph type="subTitle" idx="1"/>
           </p:nvPr>
         </p:nvSpPr>
-        <p:spPr/>
+        <p:spPr>
+          <a:xfrm>
+            <a:off x="1054833" y="4205130"/>
+            <a:ext cx="7736693" cy="1771721"/>
+          </a:xfrm>
+        </p:spPr>
         <p:txBody>
           <a:bodyPr/>
           <a:lstStyle/>
@@ -1784,6 +1790,124 @@
 </p:sld>
 </file>
 
+<file path=ppt/slides/slide13.xml><?xml version="1.0" encoding="utf-8"?>
+<p:sld xmlns:a="http://schemas.openxmlformats.org/drawingml/2006/main" xmlns:r="http://schemas.openxmlformats.org/officeDocument/2006/relationships" xmlns:p="http://schemas.openxmlformats.org/presentationml/2006/main">
+  <p:cSld>
+    <p:spTree>
+      <p:nvGrpSpPr>
+        <p:cNvPr id="1" name=""/>
+        <p:cNvGrpSpPr/>
+        <p:nvPr/>
+      </p:nvGrpSpPr>
+      <p:grpSpPr>
+        <a:xfrm>
+          <a:off x="0" y="0"/>
+          <a:ext cx="0" cy="0"/>
+          <a:chOff x="0" y="0"/>
+          <a:chExt cx="0" cy="0"/>
+        </a:xfrm>
+      </p:grpSpPr>
+      <p:sp>
+        <p:nvSpPr>
+          <p:cNvPr id="2" name="Nadpis 1">
+            <a:extLst>
+              <a:ext uri="{FF2B5EF4-FFF2-40B4-BE49-F238E27FC236}">
+                <a16:creationId xmlns:a16="http://schemas.microsoft.com/office/drawing/2014/main" id="{D7AD0CB0-383A-BE22-A75C-3CEAE71A4760}"/>
+              </a:ext>
+            </a:extLst>
+          </p:cNvPr>
+          <p:cNvSpPr>
+            <a:spLocks noGrp="1"/>
+          </p:cNvSpPr>
+          <p:nvPr>
+            <p:ph type="ctrTitle"/>
+          </p:nvPr>
+        </p:nvSpPr>
+        <p:spPr>
+          <a:xfrm>
+            <a:off x="2103457" y="566819"/>
+            <a:ext cx="7736694" cy="1446663"/>
+          </a:xfrm>
+        </p:spPr>
+        <p:txBody>
+          <a:bodyPr/>
+          <a:lstStyle/>
+          <a:p>
+            <a:r>
+              <a:rPr lang="en-US" dirty="0" err="1"/>
+              <a:t>Literatura</a:t>
+            </a:r>
+            <a:endParaRPr lang="en-US" dirty="0"/>
+          </a:p>
+        </p:txBody>
+      </p:sp>
+      <p:sp>
+        <p:nvSpPr>
+          <p:cNvPr id="3" name="Podnadpis 2">
+            <a:extLst>
+              <a:ext uri="{FF2B5EF4-FFF2-40B4-BE49-F238E27FC236}">
+                <a16:creationId xmlns:a16="http://schemas.microsoft.com/office/drawing/2014/main" id="{EB095F47-ADA0-D540-B597-E7DF3C26CBB8}"/>
+              </a:ext>
+            </a:extLst>
+          </p:cNvPr>
+          <p:cNvSpPr>
+            <a:spLocks noGrp="1"/>
+          </p:cNvSpPr>
+          <p:nvPr>
+            <p:ph type="subTitle" idx="1"/>
+          </p:nvPr>
+        </p:nvSpPr>
+        <p:spPr>
+          <a:xfrm>
+            <a:off x="327171" y="1484852"/>
+            <a:ext cx="9605393" cy="5373148"/>
+          </a:xfrm>
+        </p:spPr>
+        <p:txBody>
+          <a:bodyPr/>
+          <a:lstStyle/>
+          <a:p>
+            <a:r>
+              <a:rPr lang="en-US" dirty="0">
+                <a:hlinkClick r:id="rId2"/>
+              </a:rPr>
+              <a:t>https://www.microsoft.com/cs-cz/security/business/security-101/what-is-soar#HowdoesSOARwork</a:t>
+            </a:r>
+            <a:endParaRPr lang="en-US" dirty="0"/>
+          </a:p>
+          <a:p>
+            <a:r>
+              <a:rPr lang="cs-CZ" dirty="0"/>
+              <a:t>Obrázky vytvořeny pomocí lucidchart.com</a:t>
+            </a:r>
+          </a:p>
+          <a:p>
+            <a:endParaRPr lang="en-US" dirty="0"/>
+          </a:p>
+          <a:p>
+            <a:endParaRPr lang="en-US" dirty="0"/>
+          </a:p>
+          <a:p>
+            <a:endParaRPr lang="en-US" dirty="0"/>
+          </a:p>
+          <a:p>
+            <a:endParaRPr lang="en-US" dirty="0"/>
+          </a:p>
+        </p:txBody>
+      </p:sp>
+    </p:spTree>
+    <p:extLst>
+      <p:ext uri="{BB962C8B-B14F-4D97-AF65-F5344CB8AC3E}">
+        <p14:creationId xmlns:p14="http://schemas.microsoft.com/office/powerpoint/2010/main" val="4064436093"/>
+      </p:ext>
+    </p:extLst>
+  </p:cSld>
+  <p:clrMapOvr>
+    <a:masterClrMapping/>
+  </p:clrMapOvr>
+</p:sld>
+</file>
+
 <file path=ppt/slides/slide2.xml><?xml version="1.0" encoding="utf-8"?>
 <p:sld xmlns:a="http://schemas.openxmlformats.org/drawingml/2006/main" xmlns:r="http://schemas.openxmlformats.org/officeDocument/2006/relationships" xmlns:p="http://schemas.openxmlformats.org/presentationml/2006/main">
   <p:cSld>
@@ -1856,8 +1980,8 @@
         </p:nvSpPr>
         <p:spPr>
           <a:xfrm>
-            <a:off x="392103" y="1923325"/>
-            <a:ext cx="9472156" cy="4611699"/>
+            <a:off x="115266" y="1898158"/>
+            <a:ext cx="8961622" cy="4611699"/>
           </a:xfrm>
         </p:spPr>
         <p:txBody>
@@ -2711,12 +2835,6 @@
           <a:p>
             <a:r>
               <a:rPr lang="cs-CZ" dirty="0"/>
-              <a:t>- Vytvoření prototypu</a:t>
-            </a:r>
-          </a:p>
-          <a:p>
-            <a:r>
-              <a:rPr lang="cs-CZ" dirty="0"/>
               <a:t>- Návrh optimálního řešení</a:t>
             </a:r>
           </a:p>
@@ -2776,8 +2894,8 @@
         </p:nvSpPr>
         <p:spPr>
           <a:xfrm>
-            <a:off x="2127565" y="921215"/>
-            <a:ext cx="7736694" cy="1446663"/>
+            <a:off x="1138723" y="1113858"/>
+            <a:ext cx="8278740" cy="1446663"/>
           </a:xfrm>
         </p:spPr>
         <p:txBody>
@@ -2817,7 +2935,7 @@
         </p:nvSpPr>
         <p:spPr>
           <a:xfrm>
-            <a:off x="1138723" y="2367878"/>
+            <a:off x="1138723" y="2812495"/>
             <a:ext cx="7736693" cy="3376264"/>
           </a:xfrm>
         </p:spPr>
@@ -2827,13 +2945,19 @@
           <a:p>
             <a:r>
               <a:rPr lang="cs-CZ" dirty="0"/>
-              <a:t>Aktivní detekce a analýza síťového provozu</a:t>
-            </a:r>
-          </a:p>
-          <a:p>
-            <a:r>
-              <a:rPr lang="cs-CZ" dirty="0"/>
-              <a:t>Využití analýzy k identifikaci a izolaci kybernetických hrozeb v reálném čase.</a:t>
+              <a:t>Aktivní detekce a analýza síťového provozu na rozdíl od svých předchůdců IPS a IDS</a:t>
+            </a:r>
+          </a:p>
+          <a:p>
+            <a:r>
+              <a:rPr lang="cs-CZ" dirty="0"/>
+              <a:t>Využití analýzy k identifikaci a izolaci kybernetických hrozeb v reálném čase</a:t>
+            </a:r>
+          </a:p>
+          <a:p>
+            <a:r>
+              <a:rPr lang="cs-CZ" dirty="0"/>
+              <a:t>NDR využívá pokročilé algoritmy a strojové učení pro identifikaci sofistikovaných a předtím neznámých útoků</a:t>
             </a:r>
           </a:p>
         </p:txBody>
@@ -2923,6 +3047,72 @@
   <p:cSld>
     <p:spTree>
       <p:nvGrpSpPr>
+        <p:cNvPr id="1" name=""/>
+        <p:cNvGrpSpPr/>
+        <p:nvPr/>
+      </p:nvGrpSpPr>
+      <p:grpSpPr>
+        <a:xfrm>
+          <a:off x="0" y="0"/>
+          <a:ext cx="0" cy="0"/>
+          <a:chOff x="0" y="0"/>
+          <a:chExt cx="0" cy="0"/>
+        </a:xfrm>
+      </p:grpSpPr>
+      <p:pic>
+        <p:nvPicPr>
+          <p:cNvPr id="4" name="Zástupný obsah 3" descr="Obsah obrázku text, snímek obrazovky, Obdélník, čtverec&#10;&#10;Popis byl vytvořen automaticky">
+            <a:extLst>
+              <a:ext uri="{FF2B5EF4-FFF2-40B4-BE49-F238E27FC236}">
+                <a16:creationId xmlns:a16="http://schemas.microsoft.com/office/drawing/2014/main" id="{61D60405-477A-03A7-7858-8B179E91795B}"/>
+              </a:ext>
+            </a:extLst>
+          </p:cNvPr>
+          <p:cNvPicPr>
+            <a:picLocks noGrp="1" noChangeAspect="1"/>
+          </p:cNvPicPr>
+          <p:nvPr>
+            <p:ph idx="1"/>
+          </p:nvPr>
+        </p:nvPicPr>
+        <p:blipFill>
+          <a:blip r:embed="rId2">
+            <a:extLst>
+              <a:ext uri="{28A0092B-C50C-407E-A947-70E740481C1C}">
+                <a14:useLocalDpi xmlns:a14="http://schemas.microsoft.com/office/drawing/2010/main" val="0"/>
+              </a:ext>
+            </a:extLst>
+          </a:blip>
+          <a:stretch>
+            <a:fillRect/>
+          </a:stretch>
+        </p:blipFill>
+        <p:spPr>
+          <a:xfrm>
+            <a:off x="469402" y="270000"/>
+            <a:ext cx="8205196" cy="6318000"/>
+          </a:xfrm>
+          <a:noFill/>
+        </p:spPr>
+      </p:pic>
+    </p:spTree>
+    <p:extLst>
+      <p:ext uri="{BB962C8B-B14F-4D97-AF65-F5344CB8AC3E}">
+        <p14:creationId xmlns:p14="http://schemas.microsoft.com/office/powerpoint/2010/main" val="531077882"/>
+      </p:ext>
+    </p:extLst>
+  </p:cSld>
+  <p:clrMapOvr>
+    <a:masterClrMapping/>
+  </p:clrMapOvr>
+</p:sld>
+</file>
+
+<file path=ppt/slides/slide7.xml><?xml version="1.0" encoding="utf-8"?>
+<p:sld xmlns:a="http://schemas.openxmlformats.org/drawingml/2006/main" xmlns:r="http://schemas.openxmlformats.org/officeDocument/2006/relationships" xmlns:p="http://schemas.openxmlformats.org/presentationml/2006/main">
+  <p:cSld>
+    <p:spTree>
+      <p:nvGrpSpPr>
         <p:cNvPr id="1" name="">
           <a:extLst>
             <a:ext uri="{FF2B5EF4-FFF2-40B4-BE49-F238E27FC236}">
@@ -3000,7 +3190,56 @@
           <a:bodyPr/>
           <a:lstStyle/>
           <a:p>
-            <a:endParaRPr lang="cs-CZ" dirty="0"/>
+            <a:r>
+              <a:rPr lang="cs-CZ" dirty="0"/>
+              <a:t>Stanovíme si vlastní formát a obsah dat</a:t>
+            </a:r>
+          </a:p>
+          <a:p>
+            <a:r>
+              <a:rPr lang="cs-CZ" dirty="0"/>
+              <a:t>Také se věnujeme vytvoření bezpečnostní politiky</a:t>
+            </a:r>
+          </a:p>
+          <a:p>
+            <a:r>
+              <a:rPr lang="cs-CZ" dirty="0"/>
+              <a:t>Použití </a:t>
+            </a:r>
+            <a:r>
+              <a:rPr lang="cs-CZ" dirty="0" err="1">
+                <a:hlinkClick r:id="rId2"/>
+              </a:rPr>
+              <a:t>Zeek</a:t>
+            </a:r>
+            <a:r>
+              <a:rPr lang="cs-CZ" dirty="0"/>
+              <a:t>, </a:t>
+            </a:r>
+            <a:r>
+              <a:rPr lang="cs-CZ" dirty="0" err="1">
+                <a:hlinkClick r:id="rId3"/>
+              </a:rPr>
+              <a:t>Suricata</a:t>
+            </a:r>
+            <a:r>
+              <a:rPr lang="cs-CZ" dirty="0"/>
+              <a:t> pro NDR</a:t>
+            </a:r>
+          </a:p>
+          <a:p>
+            <a:r>
+              <a:rPr lang="cs-CZ" dirty="0"/>
+              <a:t>Pro další komponenty jako SOAR a SIEM také existují open-source varianty co si </a:t>
+            </a:r>
+            <a:r>
+              <a:rPr lang="cs-CZ" dirty="0" err="1"/>
+              <a:t>self</a:t>
+            </a:r>
+            <a:r>
+              <a:rPr lang="cs-CZ" dirty="0"/>
+              <a:t>-hostujeme</a:t>
+            </a:r>
           </a:p>
         </p:txBody>
       </p:sp>
@@ -3017,7 +3256,7 @@
 </p:sld>
 </file>
 
-<file path=ppt/slides/slide7.xml><?xml version="1.0" encoding="utf-8"?>
+<file path=ppt/slides/slide8.xml><?xml version="1.0" encoding="utf-8"?>
 <p:sld xmlns:a="http://schemas.openxmlformats.org/drawingml/2006/main" xmlns:r="http://schemas.openxmlformats.org/officeDocument/2006/relationships" xmlns:p="http://schemas.openxmlformats.org/presentationml/2006/main">
   <p:cSld>
     <p:spTree>
@@ -3091,13 +3330,90 @@
         </p:nvSpPr>
         <p:spPr>
           <a:xfrm>
-            <a:off x="1121945" y="2367878"/>
-            <a:ext cx="7736693" cy="3376264"/>
+            <a:off x="1121945" y="2181138"/>
+            <a:ext cx="7736693" cy="4253218"/>
           </a:xfrm>
         </p:spPr>
         <p:txBody>
-          <a:bodyPr/>
+          <a:bodyPr>
+            <a:normAutofit/>
+          </a:bodyPr>
           <a:lstStyle/>
+          <a:p>
+            <a:r>
+              <a:rPr lang="cs-CZ" dirty="0"/>
+              <a:t>Dodavatel řešení stanovuje formát a obsah dat.</a:t>
+            </a:r>
+          </a:p>
+          <a:p>
+            <a:r>
+              <a:rPr lang="cs-CZ" dirty="0"/>
+              <a:t>Zároveň se zabývá definicí bezpečnostní politiky a konfigurací nastavení pro detekci.</a:t>
+            </a:r>
+          </a:p>
+          <a:p>
+            <a:r>
+              <a:rPr lang="cs-CZ" dirty="0"/>
+              <a:t>Několik dodavatelů NDR:</a:t>
+            </a:r>
+          </a:p>
+          <a:p>
+            <a:r>
+              <a:rPr lang="cs-CZ" dirty="0" err="1">
+                <a:hlinkClick r:id="rId2"/>
+              </a:rPr>
+              <a:t>GreyCortex</a:t>
+            </a:r>
+            <a:r>
+              <a:rPr lang="cs-CZ" dirty="0">
+                <a:hlinkClick r:id="rId2"/>
+              </a:rPr>
+              <a:t> - Mendel</a:t>
+            </a:r>
+            <a:endParaRPr lang="cs-CZ" dirty="0"/>
+          </a:p>
+          <a:p>
+            <a:r>
+              <a:rPr lang="cs-CZ" dirty="0" err="1">
+                <a:hlinkClick r:id="rId3"/>
+              </a:rPr>
+              <a:t>Fortinet</a:t>
+            </a:r>
+            <a:r>
+              <a:rPr lang="cs-CZ" dirty="0">
+                <a:hlinkClick r:id="rId3"/>
+              </a:rPr>
+              <a:t> - </a:t>
+            </a:r>
+            <a:r>
+              <a:rPr lang="cs-CZ" dirty="0" err="1">
+                <a:hlinkClick r:id="rId3"/>
+              </a:rPr>
+              <a:t>FortiNDR</a:t>
+            </a:r>
+            <a:endParaRPr lang="cs-CZ" dirty="0"/>
+          </a:p>
+          <a:p>
+            <a:r>
+              <a:rPr lang="cs-CZ" dirty="0" err="1">
+                <a:hlinkClick r:id="rId4"/>
+              </a:rPr>
+              <a:t>Vectra</a:t>
+            </a:r>
+            <a:r>
+              <a:rPr lang="cs-CZ" dirty="0">
+                <a:hlinkClick r:id="rId4"/>
+              </a:rPr>
+              <a:t> - NDR</a:t>
+            </a:r>
+            <a:endParaRPr lang="cs-CZ" dirty="0"/>
+          </a:p>
+          <a:p>
+            <a:endParaRPr lang="cs-CZ" dirty="0"/>
+          </a:p>
+          <a:p>
+            <a:endParaRPr lang="cs-CZ" dirty="0"/>
+          </a:p>
           <a:p>
             <a:endParaRPr lang="cs-CZ" dirty="0"/>
           </a:p>
@@ -3107,105 +3423,6 @@
     <p:extLst>
       <p:ext uri="{BB962C8B-B14F-4D97-AF65-F5344CB8AC3E}">
         <p14:creationId xmlns:p14="http://schemas.microsoft.com/office/powerpoint/2010/main" val="2063145213"/>
-      </p:ext>
-    </p:extLst>
-  </p:cSld>
-  <p:clrMapOvr>
-    <a:masterClrMapping/>
-  </p:clrMapOvr>
-</p:sld>
-</file>
-
-<file path=ppt/slides/slide8.xml><?xml version="1.0" encoding="utf-8"?>
-<p:sld xmlns:a="http://schemas.openxmlformats.org/drawingml/2006/main" xmlns:r="http://schemas.openxmlformats.org/officeDocument/2006/relationships" xmlns:p="http://schemas.openxmlformats.org/presentationml/2006/main">
-  <p:cSld>
-    <p:spTree>
-      <p:nvGrpSpPr>
-        <p:cNvPr id="1" name="">
-          <a:extLst>
-            <a:ext uri="{FF2B5EF4-FFF2-40B4-BE49-F238E27FC236}">
-              <a16:creationId xmlns:a16="http://schemas.microsoft.com/office/drawing/2014/main" id="{9611D814-667D-5BEC-D0EF-C5BC1BC1CBAA}"/>
-            </a:ext>
-          </a:extLst>
-        </p:cNvPr>
-        <p:cNvGrpSpPr/>
-        <p:nvPr/>
-      </p:nvGrpSpPr>
-      <p:grpSpPr>
-        <a:xfrm>
-          <a:off x="0" y="0"/>
-          <a:ext cx="0" cy="0"/>
-          <a:chOff x="0" y="0"/>
-          <a:chExt cx="0" cy="0"/>
-        </a:xfrm>
-      </p:grpSpPr>
-      <p:sp>
-        <p:nvSpPr>
-          <p:cNvPr id="2" name="Title 1">
-            <a:extLst>
-              <a:ext uri="{FF2B5EF4-FFF2-40B4-BE49-F238E27FC236}">
-                <a16:creationId xmlns:a16="http://schemas.microsoft.com/office/drawing/2014/main" id="{4D811EB6-3B90-A124-B2FF-BAC83B047AB6}"/>
-              </a:ext>
-            </a:extLst>
-          </p:cNvPr>
-          <p:cNvSpPr>
-            <a:spLocks noGrp="1"/>
-          </p:cNvSpPr>
-          <p:nvPr>
-            <p:ph type="ctrTitle"/>
-          </p:nvPr>
-        </p:nvSpPr>
-        <p:spPr>
-          <a:xfrm>
-            <a:off x="2127565" y="921215"/>
-            <a:ext cx="7736694" cy="1446663"/>
-          </a:xfrm>
-        </p:spPr>
-        <p:txBody>
-          <a:bodyPr/>
-          <a:lstStyle/>
-          <a:p>
-            <a:r>
-              <a:rPr lang="cs-CZ" dirty="0"/>
-              <a:t>Prototyp</a:t>
-            </a:r>
-          </a:p>
-        </p:txBody>
-      </p:sp>
-      <p:sp>
-        <p:nvSpPr>
-          <p:cNvPr id="3" name="Subtitle 2">
-            <a:extLst>
-              <a:ext uri="{FF2B5EF4-FFF2-40B4-BE49-F238E27FC236}">
-                <a16:creationId xmlns:a16="http://schemas.microsoft.com/office/drawing/2014/main" id="{2B553413-047D-112D-D008-9E70B2132955}"/>
-              </a:ext>
-            </a:extLst>
-          </p:cNvPr>
-          <p:cNvSpPr>
-            <a:spLocks noGrp="1"/>
-          </p:cNvSpPr>
-          <p:nvPr>
-            <p:ph type="subTitle" idx="1"/>
-          </p:nvPr>
-        </p:nvSpPr>
-        <p:spPr>
-          <a:xfrm>
-            <a:off x="1121945" y="2367878"/>
-            <a:ext cx="7736693" cy="3376264"/>
-          </a:xfrm>
-        </p:spPr>
-        <p:txBody>
-          <a:bodyPr/>
-          <a:lstStyle/>
-          <a:p>
-            <a:endParaRPr lang="cs-CZ" dirty="0"/>
-          </a:p>
-        </p:txBody>
-      </p:sp>
-    </p:spTree>
-    <p:extLst>
-      <p:ext uri="{BB962C8B-B14F-4D97-AF65-F5344CB8AC3E}">
-        <p14:creationId xmlns:p14="http://schemas.microsoft.com/office/powerpoint/2010/main" val="522623393"/>
       </p:ext>
     </p:extLst>
   </p:cSld>
@@ -3256,7 +3473,7 @@
         </p:nvSpPr>
         <p:spPr>
           <a:xfrm>
-            <a:off x="2127565" y="921215"/>
+            <a:off x="1121945" y="1223219"/>
             <a:ext cx="7736694" cy="1446663"/>
           </a:xfrm>
         </p:spPr>

</xml_diff>

<commit_message>
worked on the present
</commit_message>
<xml_diff>
--- a/kochanek_ndr_prezentace.pptx
+++ b/kochanek_ndr_prezentace.pptx
@@ -4,6 +4,9 @@
   <p:sldMasterIdLst>
     <p:sldMasterId id="2147483672" r:id="rId1"/>
   </p:sldMasterIdLst>
+  <p:notesMasterIdLst>
+    <p:notesMasterId r:id="rId17"/>
+  </p:notesMasterIdLst>
   <p:sldIdLst>
     <p:sldId id="256" r:id="rId2"/>
     <p:sldId id="257" r:id="rId3"/>
@@ -13,25 +16,27 @@
     <p:sldId id="276" r:id="rId7"/>
     <p:sldId id="266" r:id="rId8"/>
     <p:sldId id="271" r:id="rId9"/>
-    <p:sldId id="272" r:id="rId10"/>
-    <p:sldId id="267" r:id="rId11"/>
-    <p:sldId id="263" r:id="rId12"/>
-    <p:sldId id="265" r:id="rId13"/>
-    <p:sldId id="275" r:id="rId14"/>
+    <p:sldId id="278" r:id="rId10"/>
+    <p:sldId id="272" r:id="rId11"/>
+    <p:sldId id="279" r:id="rId12"/>
+    <p:sldId id="267" r:id="rId13"/>
+    <p:sldId id="263" r:id="rId14"/>
+    <p:sldId id="265" r:id="rId15"/>
+    <p:sldId id="275" r:id="rId16"/>
   </p:sldIdLst>
   <p:sldSz cx="9144000" cy="6858000" type="screen4x3"/>
   <p:notesSz cx="6858000" cy="9144000"/>
   <p:embeddedFontLst>
     <p:embeddedFont>
       <p:font typeface="Technika" panose="020B0604020202020204" charset="0"/>
-      <p:regular r:id="rId15"/>
-      <p:bold r:id="rId16"/>
-      <p:italic r:id="rId17"/>
-      <p:boldItalic r:id="rId18"/>
+      <p:regular r:id="rId18"/>
+      <p:bold r:id="rId19"/>
+      <p:italic r:id="rId20"/>
+      <p:boldItalic r:id="rId21"/>
     </p:embeddedFont>
     <p:embeddedFont>
       <p:font typeface="Technika-Bold" panose="00000600000000000000" charset="0"/>
-      <p:regular r:id="rId19"/>
+      <p:regular r:id="rId22"/>
     </p:embeddedFont>
   </p:embeddedFontLst>
   <p:defaultTextStyle>
@@ -137,6 +142,356 @@
 </p:presentation>
 </file>
 
+<file path=ppt/notesMasters/notesMaster1.xml><?xml version="1.0" encoding="utf-8"?>
+<p:notesMaster xmlns:a="http://schemas.openxmlformats.org/drawingml/2006/main" xmlns:r="http://schemas.openxmlformats.org/officeDocument/2006/relationships" xmlns:p="http://schemas.openxmlformats.org/presentationml/2006/main">
+  <p:cSld>
+    <p:bg>
+      <p:bgRef idx="1001">
+        <a:schemeClr val="bg1"/>
+      </p:bgRef>
+    </p:bg>
+    <p:spTree>
+      <p:nvGrpSpPr>
+        <p:cNvPr id="1" name=""/>
+        <p:cNvGrpSpPr/>
+        <p:nvPr/>
+      </p:nvGrpSpPr>
+      <p:grpSpPr>
+        <a:xfrm>
+          <a:off x="0" y="0"/>
+          <a:ext cx="0" cy="0"/>
+          <a:chOff x="0" y="0"/>
+          <a:chExt cx="0" cy="0"/>
+        </a:xfrm>
+      </p:grpSpPr>
+      <p:sp>
+        <p:nvSpPr>
+          <p:cNvPr id="2" name="Header Placeholder 1"/>
+          <p:cNvSpPr>
+            <a:spLocks noGrp="1"/>
+          </p:cNvSpPr>
+          <p:nvPr>
+            <p:ph type="hdr" sz="quarter"/>
+          </p:nvPr>
+        </p:nvSpPr>
+        <p:spPr>
+          <a:xfrm>
+            <a:off x="0" y="0"/>
+            <a:ext cx="2971800" cy="458788"/>
+          </a:xfrm>
+          <a:prstGeom prst="rect">
+            <a:avLst/>
+          </a:prstGeom>
+        </p:spPr>
+        <p:txBody>
+          <a:bodyPr vert="horz" lIns="91440" tIns="45720" rIns="91440" bIns="45720" rtlCol="0"/>
+          <a:lstStyle>
+            <a:lvl1pPr algn="l">
+              <a:defRPr sz="1200"/>
+            </a:lvl1pPr>
+          </a:lstStyle>
+          <a:p>
+            <a:endParaRPr lang="cs-CZ"/>
+          </a:p>
+        </p:txBody>
+      </p:sp>
+      <p:sp>
+        <p:nvSpPr>
+          <p:cNvPr id="3" name="Date Placeholder 2"/>
+          <p:cNvSpPr>
+            <a:spLocks noGrp="1"/>
+          </p:cNvSpPr>
+          <p:nvPr>
+            <p:ph type="dt" idx="1"/>
+          </p:nvPr>
+        </p:nvSpPr>
+        <p:spPr>
+          <a:xfrm>
+            <a:off x="3884613" y="0"/>
+            <a:ext cx="2971800" cy="458788"/>
+          </a:xfrm>
+          <a:prstGeom prst="rect">
+            <a:avLst/>
+          </a:prstGeom>
+        </p:spPr>
+        <p:txBody>
+          <a:bodyPr vert="horz" lIns="91440" tIns="45720" rIns="91440" bIns="45720" rtlCol="0"/>
+          <a:lstStyle>
+            <a:lvl1pPr algn="r">
+              <a:defRPr sz="1200"/>
+            </a:lvl1pPr>
+          </a:lstStyle>
+          <a:p>
+            <a:fld id="{67A3E889-99E7-42EC-985C-BC92F6F1474B}" type="datetimeFigureOut">
+              <a:rPr lang="cs-CZ" smtClean="0"/>
+              <a:t>04.02.2024</a:t>
+            </a:fld>
+            <a:endParaRPr lang="cs-CZ"/>
+          </a:p>
+        </p:txBody>
+      </p:sp>
+      <p:sp>
+        <p:nvSpPr>
+          <p:cNvPr id="4" name="Slide Image Placeholder 3"/>
+          <p:cNvSpPr>
+            <a:spLocks noGrp="1" noRot="1" noChangeAspect="1"/>
+          </p:cNvSpPr>
+          <p:nvPr>
+            <p:ph type="sldImg" idx="2"/>
+          </p:nvPr>
+        </p:nvSpPr>
+        <p:spPr>
+          <a:xfrm>
+            <a:off x="1371600" y="1143000"/>
+            <a:ext cx="4114800" cy="3086100"/>
+          </a:xfrm>
+          <a:prstGeom prst="rect">
+            <a:avLst/>
+          </a:prstGeom>
+          <a:noFill/>
+          <a:ln w="12700">
+            <a:solidFill>
+              <a:prstClr val="black"/>
+            </a:solidFill>
+          </a:ln>
+        </p:spPr>
+        <p:txBody>
+          <a:bodyPr vert="horz" lIns="91440" tIns="45720" rIns="91440" bIns="45720" rtlCol="0" anchor="ctr"/>
+          <a:lstStyle/>
+          <a:p>
+            <a:endParaRPr lang="cs-CZ"/>
+          </a:p>
+        </p:txBody>
+      </p:sp>
+      <p:sp>
+        <p:nvSpPr>
+          <p:cNvPr id="5" name="Notes Placeholder 4"/>
+          <p:cNvSpPr>
+            <a:spLocks noGrp="1"/>
+          </p:cNvSpPr>
+          <p:nvPr>
+            <p:ph type="body" sz="quarter" idx="3"/>
+          </p:nvPr>
+        </p:nvSpPr>
+        <p:spPr>
+          <a:xfrm>
+            <a:off x="685800" y="4400550"/>
+            <a:ext cx="5486400" cy="3600450"/>
+          </a:xfrm>
+          <a:prstGeom prst="rect">
+            <a:avLst/>
+          </a:prstGeom>
+        </p:spPr>
+        <p:txBody>
+          <a:bodyPr vert="horz" lIns="91440" tIns="45720" rIns="91440" bIns="45720" rtlCol="0"/>
+          <a:lstStyle/>
+          <a:p>
+            <a:pPr lvl="0"/>
+            <a:r>
+              <a:rPr lang="en-US"/>
+              <a:t>Click to edit Master text styles</a:t>
+            </a:r>
+          </a:p>
+          <a:p>
+            <a:pPr lvl="1"/>
+            <a:r>
+              <a:rPr lang="en-US"/>
+              <a:t>Second level</a:t>
+            </a:r>
+          </a:p>
+          <a:p>
+            <a:pPr lvl="2"/>
+            <a:r>
+              <a:rPr lang="en-US"/>
+              <a:t>Third level</a:t>
+            </a:r>
+          </a:p>
+          <a:p>
+            <a:pPr lvl="3"/>
+            <a:r>
+              <a:rPr lang="en-US"/>
+              <a:t>Fourth level</a:t>
+            </a:r>
+          </a:p>
+          <a:p>
+            <a:pPr lvl="4"/>
+            <a:r>
+              <a:rPr lang="en-US"/>
+              <a:t>Fifth level</a:t>
+            </a:r>
+            <a:endParaRPr lang="cs-CZ"/>
+          </a:p>
+        </p:txBody>
+      </p:sp>
+      <p:sp>
+        <p:nvSpPr>
+          <p:cNvPr id="6" name="Footer Placeholder 5"/>
+          <p:cNvSpPr>
+            <a:spLocks noGrp="1"/>
+          </p:cNvSpPr>
+          <p:nvPr>
+            <p:ph type="ftr" sz="quarter" idx="4"/>
+          </p:nvPr>
+        </p:nvSpPr>
+        <p:spPr>
+          <a:xfrm>
+            <a:off x="0" y="8685213"/>
+            <a:ext cx="2971800" cy="458787"/>
+          </a:xfrm>
+          <a:prstGeom prst="rect">
+            <a:avLst/>
+          </a:prstGeom>
+        </p:spPr>
+        <p:txBody>
+          <a:bodyPr vert="horz" lIns="91440" tIns="45720" rIns="91440" bIns="45720" rtlCol="0" anchor="b"/>
+          <a:lstStyle>
+            <a:lvl1pPr algn="l">
+              <a:defRPr sz="1200"/>
+            </a:lvl1pPr>
+          </a:lstStyle>
+          <a:p>
+            <a:endParaRPr lang="cs-CZ"/>
+          </a:p>
+        </p:txBody>
+      </p:sp>
+      <p:sp>
+        <p:nvSpPr>
+          <p:cNvPr id="7" name="Slide Number Placeholder 6"/>
+          <p:cNvSpPr>
+            <a:spLocks noGrp="1"/>
+          </p:cNvSpPr>
+          <p:nvPr>
+            <p:ph type="sldNum" sz="quarter" idx="5"/>
+          </p:nvPr>
+        </p:nvSpPr>
+        <p:spPr>
+          <a:xfrm>
+            <a:off x="3884613" y="8685213"/>
+            <a:ext cx="2971800" cy="458787"/>
+          </a:xfrm>
+          <a:prstGeom prst="rect">
+            <a:avLst/>
+          </a:prstGeom>
+        </p:spPr>
+        <p:txBody>
+          <a:bodyPr vert="horz" lIns="91440" tIns="45720" rIns="91440" bIns="45720" rtlCol="0" anchor="b"/>
+          <a:lstStyle>
+            <a:lvl1pPr algn="r">
+              <a:defRPr sz="1200"/>
+            </a:lvl1pPr>
+          </a:lstStyle>
+          <a:p>
+            <a:fld id="{2B180F26-B581-4618-B102-A6D9929A7E0A}" type="slidenum">
+              <a:rPr lang="cs-CZ" smtClean="0"/>
+              <a:t>‹#›</a:t>
+            </a:fld>
+            <a:endParaRPr lang="cs-CZ"/>
+          </a:p>
+        </p:txBody>
+      </p:sp>
+    </p:spTree>
+    <p:extLst>
+      <p:ext uri="{BB962C8B-B14F-4D97-AF65-F5344CB8AC3E}">
+        <p14:creationId xmlns:p14="http://schemas.microsoft.com/office/powerpoint/2010/main" val="551336065"/>
+      </p:ext>
+    </p:extLst>
+  </p:cSld>
+  <p:clrMap bg1="lt1" tx1="dk1" bg2="lt2" tx2="dk2" accent1="accent1" accent2="accent2" accent3="accent3" accent4="accent4" accent5="accent5" accent6="accent6" hlink="hlink" folHlink="folHlink"/>
+  <p:notesStyle>
+    <a:lvl1pPr marL="0" algn="l" defTabSz="914400" rtl="0" eaLnBrk="1" latinLnBrk="0" hangingPunct="1">
+      <a:defRPr sz="1200" kern="1200">
+        <a:solidFill>
+          <a:schemeClr val="tx1"/>
+        </a:solidFill>
+        <a:latin typeface="+mn-lt"/>
+        <a:ea typeface="+mn-ea"/>
+        <a:cs typeface="+mn-cs"/>
+      </a:defRPr>
+    </a:lvl1pPr>
+    <a:lvl2pPr marL="457200" algn="l" defTabSz="914400" rtl="0" eaLnBrk="1" latinLnBrk="0" hangingPunct="1">
+      <a:defRPr sz="1200" kern="1200">
+        <a:solidFill>
+          <a:schemeClr val="tx1"/>
+        </a:solidFill>
+        <a:latin typeface="+mn-lt"/>
+        <a:ea typeface="+mn-ea"/>
+        <a:cs typeface="+mn-cs"/>
+      </a:defRPr>
+    </a:lvl2pPr>
+    <a:lvl3pPr marL="914400" algn="l" defTabSz="914400" rtl="0" eaLnBrk="1" latinLnBrk="0" hangingPunct="1">
+      <a:defRPr sz="1200" kern="1200">
+        <a:solidFill>
+          <a:schemeClr val="tx1"/>
+        </a:solidFill>
+        <a:latin typeface="+mn-lt"/>
+        <a:ea typeface="+mn-ea"/>
+        <a:cs typeface="+mn-cs"/>
+      </a:defRPr>
+    </a:lvl3pPr>
+    <a:lvl4pPr marL="1371600" algn="l" defTabSz="914400" rtl="0" eaLnBrk="1" latinLnBrk="0" hangingPunct="1">
+      <a:defRPr sz="1200" kern="1200">
+        <a:solidFill>
+          <a:schemeClr val="tx1"/>
+        </a:solidFill>
+        <a:latin typeface="+mn-lt"/>
+        <a:ea typeface="+mn-ea"/>
+        <a:cs typeface="+mn-cs"/>
+      </a:defRPr>
+    </a:lvl4pPr>
+    <a:lvl5pPr marL="1828800" algn="l" defTabSz="914400" rtl="0" eaLnBrk="1" latinLnBrk="0" hangingPunct="1">
+      <a:defRPr sz="1200" kern="1200">
+        <a:solidFill>
+          <a:schemeClr val="tx1"/>
+        </a:solidFill>
+        <a:latin typeface="+mn-lt"/>
+        <a:ea typeface="+mn-ea"/>
+        <a:cs typeface="+mn-cs"/>
+      </a:defRPr>
+    </a:lvl5pPr>
+    <a:lvl6pPr marL="2286000" algn="l" defTabSz="914400" rtl="0" eaLnBrk="1" latinLnBrk="0" hangingPunct="1">
+      <a:defRPr sz="1200" kern="1200">
+        <a:solidFill>
+          <a:schemeClr val="tx1"/>
+        </a:solidFill>
+        <a:latin typeface="+mn-lt"/>
+        <a:ea typeface="+mn-ea"/>
+        <a:cs typeface="+mn-cs"/>
+      </a:defRPr>
+    </a:lvl6pPr>
+    <a:lvl7pPr marL="2743200" algn="l" defTabSz="914400" rtl="0" eaLnBrk="1" latinLnBrk="0" hangingPunct="1">
+      <a:defRPr sz="1200" kern="1200">
+        <a:solidFill>
+          <a:schemeClr val="tx1"/>
+        </a:solidFill>
+        <a:latin typeface="+mn-lt"/>
+        <a:ea typeface="+mn-ea"/>
+        <a:cs typeface="+mn-cs"/>
+      </a:defRPr>
+    </a:lvl7pPr>
+    <a:lvl8pPr marL="3200400" algn="l" defTabSz="914400" rtl="0" eaLnBrk="1" latinLnBrk="0" hangingPunct="1">
+      <a:defRPr sz="1200" kern="1200">
+        <a:solidFill>
+          <a:schemeClr val="tx1"/>
+        </a:solidFill>
+        <a:latin typeface="+mn-lt"/>
+        <a:ea typeface="+mn-ea"/>
+        <a:cs typeface="+mn-cs"/>
+      </a:defRPr>
+    </a:lvl8pPr>
+    <a:lvl9pPr marL="3657600" algn="l" defTabSz="914400" rtl="0" eaLnBrk="1" latinLnBrk="0" hangingPunct="1">
+      <a:defRPr sz="1200" kern="1200">
+        <a:solidFill>
+          <a:schemeClr val="tx1"/>
+        </a:solidFill>
+        <a:latin typeface="+mn-lt"/>
+        <a:ea typeface="+mn-ea"/>
+        <a:cs typeface="+mn-cs"/>
+      </a:defRPr>
+    </a:lvl9pPr>
+  </p:notesStyle>
+</p:notesMaster>
+</file>
+
 <file path=ppt/slideLayouts/slideLayout1.xml><?xml version="1.0" encoding="utf-8"?>
 <p:sldLayout xmlns:a="http://schemas.openxmlformats.org/drawingml/2006/main" xmlns:r="http://schemas.openxmlformats.org/officeDocument/2006/relationships" xmlns:p="http://schemas.openxmlformats.org/presentationml/2006/main" type="title" preserve="1">
   <p:cSld name="Úvodní snímek">
@@ -1044,6 +1399,7 @@
     <p:sldLayoutId id="2147483685" r:id="rId4"/>
     <p:sldLayoutId id="2147483684" r:id="rId5"/>
   </p:sldLayoutIdLst>
+  <p:hf hdr="0" dt="0"/>
   <p:txStyles>
     <p:titleStyle>
       <a:lvl1pPr algn="l" defTabSz="914354" rtl="0" eaLnBrk="1" latinLnBrk="0" hangingPunct="1">
@@ -1523,6 +1879,286 @@
         <p:cNvPr id="1" name="">
           <a:extLst>
             <a:ext uri="{FF2B5EF4-FFF2-40B4-BE49-F238E27FC236}">
+              <a16:creationId xmlns:a16="http://schemas.microsoft.com/office/drawing/2014/main" id="{E27ED708-DF21-DC53-F346-D08FEF66CBEF}"/>
+            </a:ext>
+          </a:extLst>
+        </p:cNvPr>
+        <p:cNvGrpSpPr/>
+        <p:nvPr/>
+      </p:nvGrpSpPr>
+      <p:grpSpPr>
+        <a:xfrm>
+          <a:off x="0" y="0"/>
+          <a:ext cx="0" cy="0"/>
+          <a:chOff x="0" y="0"/>
+          <a:chExt cx="0" cy="0"/>
+        </a:xfrm>
+      </p:grpSpPr>
+      <p:sp>
+        <p:nvSpPr>
+          <p:cNvPr id="2" name="Title 1">
+            <a:extLst>
+              <a:ext uri="{FF2B5EF4-FFF2-40B4-BE49-F238E27FC236}">
+                <a16:creationId xmlns:a16="http://schemas.microsoft.com/office/drawing/2014/main" id="{169F1141-C080-1630-FB60-A028856C9496}"/>
+              </a:ext>
+            </a:extLst>
+          </p:cNvPr>
+          <p:cNvSpPr>
+            <a:spLocks noGrp="1"/>
+          </p:cNvSpPr>
+          <p:nvPr>
+            <p:ph type="ctrTitle"/>
+          </p:nvPr>
+        </p:nvSpPr>
+        <p:spPr>
+          <a:xfrm>
+            <a:off x="1121945" y="1223219"/>
+            <a:ext cx="7736694" cy="1446663"/>
+          </a:xfrm>
+        </p:spPr>
+        <p:txBody>
+          <a:bodyPr/>
+          <a:lstStyle/>
+          <a:p>
+            <a:r>
+              <a:rPr lang="cs-CZ" dirty="0"/>
+              <a:t>Návrh optimálního řešení</a:t>
+            </a:r>
+          </a:p>
+        </p:txBody>
+      </p:sp>
+      <p:sp>
+        <p:nvSpPr>
+          <p:cNvPr id="3" name="Subtitle 2">
+            <a:extLst>
+              <a:ext uri="{FF2B5EF4-FFF2-40B4-BE49-F238E27FC236}">
+                <a16:creationId xmlns:a16="http://schemas.microsoft.com/office/drawing/2014/main" id="{73FBB818-19F8-FECE-A60A-A4F85D8289F8}"/>
+              </a:ext>
+            </a:extLst>
+          </p:cNvPr>
+          <p:cNvSpPr>
+            <a:spLocks noGrp="1"/>
+          </p:cNvSpPr>
+          <p:nvPr>
+            <p:ph type="subTitle" idx="1"/>
+          </p:nvPr>
+        </p:nvSpPr>
+        <p:spPr>
+          <a:xfrm>
+            <a:off x="1121945" y="2367878"/>
+            <a:ext cx="7736693" cy="3376264"/>
+          </a:xfrm>
+        </p:spPr>
+        <p:txBody>
+          <a:bodyPr/>
+          <a:lstStyle/>
+          <a:p>
+            <a:r>
+              <a:rPr lang="cs-CZ" dirty="0"/>
+              <a:t>Pro Firewall:</a:t>
+            </a:r>
+          </a:p>
+          <a:p>
+            <a:r>
+              <a:rPr lang="cs-CZ" dirty="0"/>
+              <a:t>NGFW – Next Generation Firewall </a:t>
+            </a:r>
+          </a:p>
+          <a:p>
+            <a:r>
+              <a:rPr lang="cs-CZ" dirty="0"/>
+              <a:t>S fu</a:t>
+            </a:r>
+            <a:r>
+              <a:rPr lang="en-US" dirty="0"/>
+              <a:t>n</a:t>
+            </a:r>
+            <a:r>
+              <a:rPr lang="cs-CZ" dirty="0"/>
+              <a:t>kcionalitami jako Deep Packet Inspection a App Filtering</a:t>
+            </a:r>
+            <a:endParaRPr lang="en-US" dirty="0"/>
+          </a:p>
+          <a:p>
+            <a:endParaRPr lang="en-US" dirty="0"/>
+          </a:p>
+          <a:p>
+            <a:r>
+              <a:rPr lang="en-US" dirty="0"/>
+              <a:t>Strategicky um</a:t>
+            </a:r>
+            <a:r>
+              <a:rPr lang="cs-CZ" dirty="0"/>
+              <a:t>ístěň na perimetr sítě a na klíčové body</a:t>
+            </a:r>
+            <a:endParaRPr lang="en-US" dirty="0"/>
+          </a:p>
+          <a:p>
+            <a:endParaRPr lang="cs-CZ" dirty="0"/>
+          </a:p>
+        </p:txBody>
+      </p:sp>
+    </p:spTree>
+    <p:extLst>
+      <p:ext uri="{BB962C8B-B14F-4D97-AF65-F5344CB8AC3E}">
+        <p14:creationId xmlns:p14="http://schemas.microsoft.com/office/powerpoint/2010/main" val="232949651"/>
+      </p:ext>
+    </p:extLst>
+  </p:cSld>
+  <p:clrMapOvr>
+    <a:masterClrMapping/>
+  </p:clrMapOvr>
+</p:sld>
+</file>
+
+<file path=ppt/slides/slide11.xml><?xml version="1.0" encoding="utf-8"?>
+<p:sld xmlns:a="http://schemas.openxmlformats.org/drawingml/2006/main" xmlns:r="http://schemas.openxmlformats.org/officeDocument/2006/relationships" xmlns:p="http://schemas.openxmlformats.org/presentationml/2006/main">
+  <p:cSld>
+    <p:spTree>
+      <p:nvGrpSpPr>
+        <p:cNvPr id="1" name="">
+          <a:extLst>
+            <a:ext uri="{FF2B5EF4-FFF2-40B4-BE49-F238E27FC236}">
+              <a16:creationId xmlns:a16="http://schemas.microsoft.com/office/drawing/2014/main" id="{8C5E2FEF-2DEF-8D0B-9E06-C93584761DEC}"/>
+            </a:ext>
+          </a:extLst>
+        </p:cNvPr>
+        <p:cNvGrpSpPr/>
+        <p:nvPr/>
+      </p:nvGrpSpPr>
+      <p:grpSpPr>
+        <a:xfrm>
+          <a:off x="0" y="0"/>
+          <a:ext cx="0" cy="0"/>
+          <a:chOff x="0" y="0"/>
+          <a:chExt cx="0" cy="0"/>
+        </a:xfrm>
+      </p:grpSpPr>
+      <p:sp>
+        <p:nvSpPr>
+          <p:cNvPr id="2" name="Title 1">
+            <a:extLst>
+              <a:ext uri="{FF2B5EF4-FFF2-40B4-BE49-F238E27FC236}">
+                <a16:creationId xmlns:a16="http://schemas.microsoft.com/office/drawing/2014/main" id="{44654ECB-C33E-5E68-9942-ED94E0112419}"/>
+              </a:ext>
+            </a:extLst>
+          </p:cNvPr>
+          <p:cNvSpPr>
+            <a:spLocks noGrp="1"/>
+          </p:cNvSpPr>
+          <p:nvPr>
+            <p:ph type="ctrTitle"/>
+          </p:nvPr>
+        </p:nvSpPr>
+        <p:spPr>
+          <a:xfrm>
+            <a:off x="1121945" y="1223219"/>
+            <a:ext cx="7736694" cy="1446663"/>
+          </a:xfrm>
+        </p:spPr>
+        <p:txBody>
+          <a:bodyPr/>
+          <a:lstStyle/>
+          <a:p>
+            <a:r>
+              <a:rPr lang="cs-CZ" dirty="0"/>
+              <a:t>Návrh optimálního řešení</a:t>
+            </a:r>
+          </a:p>
+        </p:txBody>
+      </p:sp>
+      <p:sp>
+        <p:nvSpPr>
+          <p:cNvPr id="3" name="Subtitle 2">
+            <a:extLst>
+              <a:ext uri="{FF2B5EF4-FFF2-40B4-BE49-F238E27FC236}">
+                <a16:creationId xmlns:a16="http://schemas.microsoft.com/office/drawing/2014/main" id="{E2158305-1D57-1DDA-6C64-35605907553C}"/>
+              </a:ext>
+            </a:extLst>
+          </p:cNvPr>
+          <p:cNvSpPr>
+            <a:spLocks noGrp="1"/>
+          </p:cNvSpPr>
+          <p:nvPr>
+            <p:ph type="subTitle" idx="1"/>
+          </p:nvPr>
+        </p:nvSpPr>
+        <p:spPr>
+          <a:xfrm>
+            <a:off x="1121945" y="2367878"/>
+            <a:ext cx="7736693" cy="3376264"/>
+          </a:xfrm>
+        </p:spPr>
+        <p:txBody>
+          <a:bodyPr/>
+          <a:lstStyle/>
+          <a:p>
+            <a:r>
+              <a:rPr lang="cs-CZ" dirty="0"/>
+              <a:t>Pro Firewall:</a:t>
+            </a:r>
+          </a:p>
+          <a:p>
+            <a:r>
+              <a:rPr lang="cs-CZ" dirty="0"/>
+              <a:t>NGFW – Next Generation Firewall </a:t>
+            </a:r>
+          </a:p>
+          <a:p>
+            <a:r>
+              <a:rPr lang="cs-CZ" dirty="0"/>
+              <a:t>S fu</a:t>
+            </a:r>
+            <a:r>
+              <a:rPr lang="en-US" dirty="0"/>
+              <a:t>n</a:t>
+            </a:r>
+            <a:r>
+              <a:rPr lang="cs-CZ" dirty="0"/>
+              <a:t>kcionalitami jako Deep Packet Inspection a App Filtering</a:t>
+            </a:r>
+            <a:endParaRPr lang="en-US" dirty="0"/>
+          </a:p>
+          <a:p>
+            <a:endParaRPr lang="en-US" dirty="0"/>
+          </a:p>
+          <a:p>
+            <a:r>
+              <a:rPr lang="en-US" dirty="0"/>
+              <a:t>Strategicky um</a:t>
+            </a:r>
+            <a:r>
+              <a:rPr lang="cs-CZ" dirty="0"/>
+              <a:t>ístěň na perimetr sítě a na klíčové body</a:t>
+            </a:r>
+            <a:endParaRPr lang="en-US" dirty="0"/>
+          </a:p>
+          <a:p>
+            <a:endParaRPr lang="cs-CZ" dirty="0"/>
+          </a:p>
+        </p:txBody>
+      </p:sp>
+    </p:spTree>
+    <p:extLst>
+      <p:ext uri="{BB962C8B-B14F-4D97-AF65-F5344CB8AC3E}">
+        <p14:creationId xmlns:p14="http://schemas.microsoft.com/office/powerpoint/2010/main" val="151270880"/>
+      </p:ext>
+    </p:extLst>
+  </p:cSld>
+  <p:clrMapOvr>
+    <a:masterClrMapping/>
+  </p:clrMapOvr>
+</p:sld>
+</file>
+
+<file path=ppt/slides/slide12.xml><?xml version="1.0" encoding="utf-8"?>
+<p:sld xmlns:a="http://schemas.openxmlformats.org/drawingml/2006/main" xmlns:r="http://schemas.openxmlformats.org/officeDocument/2006/relationships" xmlns:p="http://schemas.openxmlformats.org/presentationml/2006/main">
+  <p:cSld>
+    <p:spTree>
+      <p:nvGrpSpPr>
+        <p:cNvPr id="1" name="">
+          <a:extLst>
+            <a:ext uri="{FF2B5EF4-FFF2-40B4-BE49-F238E27FC236}">
               <a16:creationId xmlns:a16="http://schemas.microsoft.com/office/drawing/2014/main" id="{902D919D-87F2-F345-0856-D1858BECF8B7}"/>
             </a:ext>
           </a:extLst>
@@ -1614,7 +2250,7 @@
 </p:sld>
 </file>
 
-<file path=ppt/slides/slide11.xml><?xml version="1.0" encoding="utf-8"?>
+<file path=ppt/slides/slide13.xml><?xml version="1.0" encoding="utf-8"?>
 <p:sld xmlns:a="http://schemas.openxmlformats.org/drawingml/2006/main" xmlns:r="http://schemas.openxmlformats.org/officeDocument/2006/relationships" xmlns:p="http://schemas.openxmlformats.org/presentationml/2006/main">
   <p:cSld>
     <p:spTree>
@@ -1702,7 +2338,7 @@
 </p:sld>
 </file>
 
-<file path=ppt/slides/slide12.xml><?xml version="1.0" encoding="utf-8"?>
+<file path=ppt/slides/slide14.xml><?xml version="1.0" encoding="utf-8"?>
 <p:sld xmlns:a="http://schemas.openxmlformats.org/drawingml/2006/main" xmlns:r="http://schemas.openxmlformats.org/officeDocument/2006/relationships" xmlns:p="http://schemas.openxmlformats.org/presentationml/2006/main">
   <p:cSld>
     <p:spTree>
@@ -1737,8 +2373,8 @@
         </p:nvSpPr>
         <p:spPr>
           <a:xfrm>
-            <a:off x="2029910" y="3140632"/>
-            <a:ext cx="7736694" cy="1446663"/>
+            <a:off x="1520982" y="2705668"/>
+            <a:ext cx="6102036" cy="1446663"/>
           </a:xfrm>
         </p:spPr>
         <p:txBody>
@@ -1749,31 +2385,6 @@
               <a:rPr lang="cs-CZ" dirty="0"/>
               <a:t>Děkuji za pozornost</a:t>
             </a:r>
-          </a:p>
-        </p:txBody>
-      </p:sp>
-      <p:sp>
-        <p:nvSpPr>
-          <p:cNvPr id="3" name="Subtitle 2">
-            <a:extLst>
-              <a:ext uri="{FF2B5EF4-FFF2-40B4-BE49-F238E27FC236}">
-                <a16:creationId xmlns:a16="http://schemas.microsoft.com/office/drawing/2014/main" id="{D7D22888-2695-1B13-7044-CBFE6CCD7732}"/>
-              </a:ext>
-            </a:extLst>
-          </p:cNvPr>
-          <p:cNvSpPr>
-            <a:spLocks noGrp="1"/>
-          </p:cNvSpPr>
-          <p:nvPr>
-            <p:ph type="subTitle" idx="1"/>
-          </p:nvPr>
-        </p:nvSpPr>
-        <p:spPr/>
-        <p:txBody>
-          <a:bodyPr/>
-          <a:lstStyle/>
-          <a:p>
-            <a:endParaRPr lang="cs-CZ" dirty="0"/>
           </a:p>
         </p:txBody>
       </p:sp>
@@ -1790,7 +2401,7 @@
 </p:sld>
 </file>
 
-<file path=ppt/slides/slide13.xml><?xml version="1.0" encoding="utf-8"?>
+<file path=ppt/slides/slide15.xml><?xml version="1.0" encoding="utf-8"?>
 <p:sld xmlns:a="http://schemas.openxmlformats.org/drawingml/2006/main" xmlns:r="http://schemas.openxmlformats.org/officeDocument/2006/relationships" xmlns:p="http://schemas.openxmlformats.org/presentationml/2006/main">
   <p:cSld>
     <p:spTree>
@@ -1864,34 +2475,36 @@
           </a:xfrm>
         </p:spPr>
         <p:txBody>
-          <a:bodyPr/>
+          <a:bodyPr>
+            <a:normAutofit/>
+          </a:bodyPr>
           <a:lstStyle/>
           <a:p>
             <a:r>
-              <a:rPr lang="en-US" dirty="0">
+              <a:rPr lang="en-US" sz="1800" dirty="0">
                 <a:hlinkClick r:id="rId2"/>
               </a:rPr>
               <a:t>https://www.microsoft.com/cs-cz/security/business/security-101/what-is-soar#HowdoesSOARwork</a:t>
             </a:r>
-            <a:endParaRPr lang="en-US" dirty="0"/>
-          </a:p>
-          <a:p>
-            <a:r>
-              <a:rPr lang="cs-CZ" dirty="0"/>
+            <a:endParaRPr lang="en-US" sz="1800" dirty="0"/>
+          </a:p>
+          <a:p>
+            <a:r>
+              <a:rPr lang="cs-CZ" sz="1800" dirty="0"/>
               <a:t>Obrázky vytvořeny pomocí lucidchart.com</a:t>
             </a:r>
           </a:p>
           <a:p>
-            <a:endParaRPr lang="en-US" dirty="0"/>
-          </a:p>
-          <a:p>
-            <a:endParaRPr lang="en-US" dirty="0"/>
-          </a:p>
-          <a:p>
-            <a:endParaRPr lang="en-US" dirty="0"/>
-          </a:p>
-          <a:p>
-            <a:endParaRPr lang="en-US" dirty="0"/>
+            <a:endParaRPr lang="en-US" sz="1800" dirty="0"/>
+          </a:p>
+          <a:p>
+            <a:endParaRPr lang="en-US" sz="1800" dirty="0"/>
+          </a:p>
+          <a:p>
+            <a:endParaRPr lang="en-US" sz="1800" dirty="0"/>
+          </a:p>
+          <a:p>
+            <a:endParaRPr lang="en-US" sz="1800" dirty="0"/>
           </a:p>
         </p:txBody>
       </p:sp>
@@ -3437,13 +4050,7 @@
   <p:cSld>
     <p:spTree>
       <p:nvGrpSpPr>
-        <p:cNvPr id="1" name="">
-          <a:extLst>
-            <a:ext uri="{FF2B5EF4-FFF2-40B4-BE49-F238E27FC236}">
-              <a16:creationId xmlns:a16="http://schemas.microsoft.com/office/drawing/2014/main" id="{E27ED708-DF21-DC53-F346-D08FEF66CBEF}"/>
-            </a:ext>
-          </a:extLst>
-        </p:cNvPr>
+        <p:cNvPr id="1" name=""/>
         <p:cNvGrpSpPr/>
         <p:nvPr/>
       </p:nvGrpSpPr>
@@ -3455,73 +4062,77 @@
           <a:chExt cx="0" cy="0"/>
         </a:xfrm>
       </p:grpSpPr>
-      <p:sp>
-        <p:nvSpPr>
-          <p:cNvPr id="2" name="Title 1">
+      <p:pic>
+        <p:nvPicPr>
+          <p:cNvPr id="5" name="Picture 4" descr="A screenshot of a computer&#10;&#10;Description automatically generated">
             <a:extLst>
               <a:ext uri="{FF2B5EF4-FFF2-40B4-BE49-F238E27FC236}">
-                <a16:creationId xmlns:a16="http://schemas.microsoft.com/office/drawing/2014/main" id="{169F1141-C080-1630-FB60-A028856C9496}"/>
+                <a16:creationId xmlns:a16="http://schemas.microsoft.com/office/drawing/2014/main" id="{D811E076-AE8C-F29D-12A8-35B7FF62D439}"/>
               </a:ext>
             </a:extLst>
           </p:cNvPr>
-          <p:cNvSpPr>
-            <a:spLocks noGrp="1"/>
-          </p:cNvSpPr>
-          <p:nvPr>
-            <p:ph type="ctrTitle"/>
-          </p:nvPr>
-        </p:nvSpPr>
+          <p:cNvPicPr>
+            <a:picLocks noChangeAspect="1"/>
+          </p:cNvPicPr>
+          <p:nvPr/>
+        </p:nvPicPr>
+        <p:blipFill>
+          <a:blip r:embed="rId2"/>
+          <a:stretch>
+            <a:fillRect/>
+          </a:stretch>
+        </p:blipFill>
         <p:spPr>
           <a:xfrm>
-            <a:off x="1121945" y="1223219"/>
-            <a:ext cx="7736694" cy="1446663"/>
-          </a:xfrm>
-        </p:spPr>
-        <p:txBody>
-          <a:bodyPr/>
-          <a:lstStyle/>
-          <a:p>
-            <a:r>
-              <a:rPr lang="cs-CZ" dirty="0"/>
-              <a:t>Návrh optimálního řešení</a:t>
-            </a:r>
-          </a:p>
-        </p:txBody>
-      </p:sp>
+            <a:off x="270000" y="1396305"/>
+            <a:ext cx="8604000" cy="4065389"/>
+          </a:xfrm>
+          <a:prstGeom prst="rect">
+            <a:avLst/>
+          </a:prstGeom>
+          <a:noFill/>
+        </p:spPr>
+      </p:pic>
       <p:sp>
         <p:nvSpPr>
-          <p:cNvPr id="3" name="Subtitle 2">
+          <p:cNvPr id="6" name="TextBox 5">
             <a:extLst>
               <a:ext uri="{FF2B5EF4-FFF2-40B4-BE49-F238E27FC236}">
-                <a16:creationId xmlns:a16="http://schemas.microsoft.com/office/drawing/2014/main" id="{73FBB818-19F8-FECE-A60A-A4F85D8289F8}"/>
+                <a16:creationId xmlns:a16="http://schemas.microsoft.com/office/drawing/2014/main" id="{192CEC62-B980-E05C-4581-3E33ACCA05A5}"/>
               </a:ext>
             </a:extLst>
           </p:cNvPr>
-          <p:cNvSpPr>
-            <a:spLocks noGrp="1"/>
-          </p:cNvSpPr>
-          <p:nvPr>
-            <p:ph type="subTitle" idx="1"/>
-          </p:nvPr>
+          <p:cNvSpPr txBox="1"/>
+          <p:nvPr/>
         </p:nvSpPr>
         <p:spPr>
           <a:xfrm>
-            <a:off x="1121945" y="2367878"/>
-            <a:ext cx="7736693" cy="3376264"/>
-          </a:xfrm>
+            <a:off x="2672179" y="630315"/>
+            <a:ext cx="1829347" cy="523220"/>
+          </a:xfrm>
+          <a:prstGeom prst="rect">
+            <a:avLst/>
+          </a:prstGeom>
+          <a:noFill/>
         </p:spPr>
         <p:txBody>
-          <a:bodyPr/>
+          <a:bodyPr wrap="none" rtlCol="0">
+            <a:spAutoFit/>
+          </a:bodyPr>
           <a:lstStyle/>
           <a:p>
-            <a:endParaRPr lang="cs-CZ" dirty="0"/>
+            <a:r>
+              <a:rPr lang="en-US" sz="2800" dirty="0" err="1"/>
+              <a:t>FortiNDR</a:t>
+            </a:r>
+            <a:endParaRPr lang="cs-CZ" sz="2800" dirty="0"/>
           </a:p>
         </p:txBody>
       </p:sp>
     </p:spTree>
     <p:extLst>
       <p:ext uri="{BB962C8B-B14F-4D97-AF65-F5344CB8AC3E}">
-        <p14:creationId xmlns:p14="http://schemas.microsoft.com/office/powerpoint/2010/main" val="232949651"/>
+        <p14:creationId xmlns:p14="http://schemas.microsoft.com/office/powerpoint/2010/main" val="3418805476"/>
       </p:ext>
     </p:extLst>
   </p:cSld>
@@ -3730,4 +4341,299 @@
     </a:ext>
   </a:extLst>
 </a:theme>
+</file>
+
+<file path=ppt/theme/theme2.xml><?xml version="1.0" encoding="utf-8"?>
+<a:theme xmlns:a="http://schemas.openxmlformats.org/drawingml/2006/main" name="Office Theme">
+  <a:themeElements>
+    <a:clrScheme name="Office">
+      <a:dk1>
+        <a:sysClr val="windowText" lastClr="000000"/>
+      </a:dk1>
+      <a:lt1>
+        <a:sysClr val="window" lastClr="FFFFFF"/>
+      </a:lt1>
+      <a:dk2>
+        <a:srgbClr val="44546A"/>
+      </a:dk2>
+      <a:lt2>
+        <a:srgbClr val="E7E6E6"/>
+      </a:lt2>
+      <a:accent1>
+        <a:srgbClr val="4472C4"/>
+      </a:accent1>
+      <a:accent2>
+        <a:srgbClr val="ED7D31"/>
+      </a:accent2>
+      <a:accent3>
+        <a:srgbClr val="A5A5A5"/>
+      </a:accent3>
+      <a:accent4>
+        <a:srgbClr val="FFC000"/>
+      </a:accent4>
+      <a:accent5>
+        <a:srgbClr val="5B9BD5"/>
+      </a:accent5>
+      <a:accent6>
+        <a:srgbClr val="70AD47"/>
+      </a:accent6>
+      <a:hlink>
+        <a:srgbClr val="0563C1"/>
+      </a:hlink>
+      <a:folHlink>
+        <a:srgbClr val="954F72"/>
+      </a:folHlink>
+    </a:clrScheme>
+    <a:fontScheme name="Office">
+      <a:majorFont>
+        <a:latin typeface="Calibri Light" panose="020F0302020204030204"/>
+        <a:ea typeface=""/>
+        <a:cs typeface=""/>
+        <a:font script="Jpan" typeface="游ゴシック Light"/>
+        <a:font script="Hang" typeface="맑은 고딕"/>
+        <a:font script="Hans" typeface="等线 Light"/>
+        <a:font script="Hant" typeface="新細明體"/>
+        <a:font script="Arab" typeface="Times New Roman"/>
+        <a:font script="Hebr" typeface="Times New Roman"/>
+        <a:font script="Thai" typeface="Angsana New"/>
+        <a:font script="Ethi" typeface="Nyala"/>
+        <a:font script="Beng" typeface="Vrinda"/>
+        <a:font script="Gujr" typeface="Shruti"/>
+        <a:font script="Khmr" typeface="MoolBoran"/>
+        <a:font script="Knda" typeface="Tunga"/>
+        <a:font script="Guru" typeface="Raavi"/>
+        <a:font script="Cans" typeface="Euphemia"/>
+        <a:font script="Cher" typeface="Plantagenet Cherokee"/>
+        <a:font script="Yiii" typeface="Microsoft Yi Baiti"/>
+        <a:font script="Tibt" typeface="Microsoft Himalaya"/>
+        <a:font script="Thaa" typeface="MV Boli"/>
+        <a:font script="Deva" typeface="Mangal"/>
+        <a:font script="Telu" typeface="Gautami"/>
+        <a:font script="Taml" typeface="Latha"/>
+        <a:font script="Syrc" typeface="Estrangelo Edessa"/>
+        <a:font script="Orya" typeface="Kalinga"/>
+        <a:font script="Mlym" typeface="Kartika"/>
+        <a:font script="Laoo" typeface="DokChampa"/>
+        <a:font script="Sinh" typeface="Iskoola Pota"/>
+        <a:font script="Mong" typeface="Mongolian Baiti"/>
+        <a:font script="Viet" typeface="Times New Roman"/>
+        <a:font script="Uigh" typeface="Microsoft Uighur"/>
+        <a:font script="Geor" typeface="Sylfaen"/>
+        <a:font script="Armn" typeface="Arial"/>
+        <a:font script="Bugi" typeface="Leelawadee UI"/>
+        <a:font script="Bopo" typeface="Microsoft JhengHei"/>
+        <a:font script="Java" typeface="Javanese Text"/>
+        <a:font script="Lisu" typeface="Segoe UI"/>
+        <a:font script="Mymr" typeface="Myanmar Text"/>
+        <a:font script="Nkoo" typeface="Ebrima"/>
+        <a:font script="Olck" typeface="Nirmala UI"/>
+        <a:font script="Osma" typeface="Ebrima"/>
+        <a:font script="Phag" typeface="Phagspa"/>
+        <a:font script="Syrn" typeface="Estrangelo Edessa"/>
+        <a:font script="Syrj" typeface="Estrangelo Edessa"/>
+        <a:font script="Syre" typeface="Estrangelo Edessa"/>
+        <a:font script="Sora" typeface="Nirmala UI"/>
+        <a:font script="Tale" typeface="Microsoft Tai Le"/>
+        <a:font script="Talu" typeface="Microsoft New Tai Lue"/>
+        <a:font script="Tfng" typeface="Ebrima"/>
+      </a:majorFont>
+      <a:minorFont>
+        <a:latin typeface="Calibri" panose="020F0502020204030204"/>
+        <a:ea typeface=""/>
+        <a:cs typeface=""/>
+        <a:font script="Jpan" typeface="游ゴシック"/>
+        <a:font script="Hang" typeface="맑은 고딕"/>
+        <a:font script="Hans" typeface="等线"/>
+        <a:font script="Hant" typeface="新細明體"/>
+        <a:font script="Arab" typeface="Arial"/>
+        <a:font script="Hebr" typeface="Arial"/>
+        <a:font script="Thai" typeface="Cordia New"/>
+        <a:font script="Ethi" typeface="Nyala"/>
+        <a:font script="Beng" typeface="Vrinda"/>
+        <a:font script="Gujr" typeface="Shruti"/>
+        <a:font script="Khmr" typeface="DaunPenh"/>
+        <a:font script="Knda" typeface="Tunga"/>
+        <a:font script="Guru" typeface="Raavi"/>
+        <a:font script="Cans" typeface="Euphemia"/>
+        <a:font script="Cher" typeface="Plantagenet Cherokee"/>
+        <a:font script="Yiii" typeface="Microsoft Yi Baiti"/>
+        <a:font script="Tibt" typeface="Microsoft Himalaya"/>
+        <a:font script="Thaa" typeface="MV Boli"/>
+        <a:font script="Deva" typeface="Mangal"/>
+        <a:font script="Telu" typeface="Gautami"/>
+        <a:font script="Taml" typeface="Latha"/>
+        <a:font script="Syrc" typeface="Estrangelo Edessa"/>
+        <a:font script="Orya" typeface="Kalinga"/>
+        <a:font script="Mlym" typeface="Kartika"/>
+        <a:font script="Laoo" typeface="DokChampa"/>
+        <a:font script="Sinh" typeface="Iskoola Pota"/>
+        <a:font script="Mong" typeface="Mongolian Baiti"/>
+        <a:font script="Viet" typeface="Arial"/>
+        <a:font script="Uigh" typeface="Microsoft Uighur"/>
+        <a:font script="Geor" typeface="Sylfaen"/>
+        <a:font script="Armn" typeface="Arial"/>
+        <a:font script="Bugi" typeface="Leelawadee UI"/>
+        <a:font script="Bopo" typeface="Microsoft JhengHei"/>
+        <a:font script="Java" typeface="Javanese Text"/>
+        <a:font script="Lisu" typeface="Segoe UI"/>
+        <a:font script="Mymr" typeface="Myanmar Text"/>
+        <a:font script="Nkoo" typeface="Ebrima"/>
+        <a:font script="Olck" typeface="Nirmala UI"/>
+        <a:font script="Osma" typeface="Ebrima"/>
+        <a:font script="Phag" typeface="Phagspa"/>
+        <a:font script="Syrn" typeface="Estrangelo Edessa"/>
+        <a:font script="Syrj" typeface="Estrangelo Edessa"/>
+        <a:font script="Syre" typeface="Estrangelo Edessa"/>
+        <a:font script="Sora" typeface="Nirmala UI"/>
+        <a:font script="Tale" typeface="Microsoft Tai Le"/>
+        <a:font script="Talu" typeface="Microsoft New Tai Lue"/>
+        <a:font script="Tfng" typeface="Ebrima"/>
+      </a:minorFont>
+    </a:fontScheme>
+    <a:fmtScheme name="Office">
+      <a:fillStyleLst>
+        <a:solidFill>
+          <a:schemeClr val="phClr"/>
+        </a:solidFill>
+        <a:gradFill rotWithShape="1">
+          <a:gsLst>
+            <a:gs pos="0">
+              <a:schemeClr val="phClr">
+                <a:lumMod val="110000"/>
+                <a:satMod val="105000"/>
+                <a:tint val="67000"/>
+              </a:schemeClr>
+            </a:gs>
+            <a:gs pos="50000">
+              <a:schemeClr val="phClr">
+                <a:lumMod val="105000"/>
+                <a:satMod val="103000"/>
+                <a:tint val="73000"/>
+              </a:schemeClr>
+            </a:gs>
+            <a:gs pos="100000">
+              <a:schemeClr val="phClr">
+                <a:lumMod val="105000"/>
+                <a:satMod val="109000"/>
+                <a:tint val="81000"/>
+              </a:schemeClr>
+            </a:gs>
+          </a:gsLst>
+          <a:lin ang="5400000" scaled="0"/>
+        </a:gradFill>
+        <a:gradFill rotWithShape="1">
+          <a:gsLst>
+            <a:gs pos="0">
+              <a:schemeClr val="phClr">
+                <a:satMod val="103000"/>
+                <a:lumMod val="102000"/>
+                <a:tint val="94000"/>
+              </a:schemeClr>
+            </a:gs>
+            <a:gs pos="50000">
+              <a:schemeClr val="phClr">
+                <a:satMod val="110000"/>
+                <a:lumMod val="100000"/>
+                <a:shade val="100000"/>
+              </a:schemeClr>
+            </a:gs>
+            <a:gs pos="100000">
+              <a:schemeClr val="phClr">
+                <a:lumMod val="99000"/>
+                <a:satMod val="120000"/>
+                <a:shade val="78000"/>
+              </a:schemeClr>
+            </a:gs>
+          </a:gsLst>
+          <a:lin ang="5400000" scaled="0"/>
+        </a:gradFill>
+      </a:fillStyleLst>
+      <a:lnStyleLst>
+        <a:ln w="6350" cap="flat" cmpd="sng" algn="ctr">
+          <a:solidFill>
+            <a:schemeClr val="phClr"/>
+          </a:solidFill>
+          <a:prstDash val="solid"/>
+          <a:miter lim="800000"/>
+        </a:ln>
+        <a:ln w="12700" cap="flat" cmpd="sng" algn="ctr">
+          <a:solidFill>
+            <a:schemeClr val="phClr"/>
+          </a:solidFill>
+          <a:prstDash val="solid"/>
+          <a:miter lim="800000"/>
+        </a:ln>
+        <a:ln w="19050" cap="flat" cmpd="sng" algn="ctr">
+          <a:solidFill>
+            <a:schemeClr val="phClr"/>
+          </a:solidFill>
+          <a:prstDash val="solid"/>
+          <a:miter lim="800000"/>
+        </a:ln>
+      </a:lnStyleLst>
+      <a:effectStyleLst>
+        <a:effectStyle>
+          <a:effectLst/>
+        </a:effectStyle>
+        <a:effectStyle>
+          <a:effectLst/>
+        </a:effectStyle>
+        <a:effectStyle>
+          <a:effectLst>
+            <a:outerShdw blurRad="57150" dist="19050" dir="5400000" algn="ctr" rotWithShape="0">
+              <a:srgbClr val="000000">
+                <a:alpha val="63000"/>
+              </a:srgbClr>
+            </a:outerShdw>
+          </a:effectLst>
+        </a:effectStyle>
+      </a:effectStyleLst>
+      <a:bgFillStyleLst>
+        <a:solidFill>
+          <a:schemeClr val="phClr"/>
+        </a:solidFill>
+        <a:solidFill>
+          <a:schemeClr val="phClr">
+            <a:tint val="95000"/>
+            <a:satMod val="170000"/>
+          </a:schemeClr>
+        </a:solidFill>
+        <a:gradFill rotWithShape="1">
+          <a:gsLst>
+            <a:gs pos="0">
+              <a:schemeClr val="phClr">
+                <a:tint val="93000"/>
+                <a:satMod val="150000"/>
+                <a:shade val="98000"/>
+                <a:lumMod val="102000"/>
+              </a:schemeClr>
+            </a:gs>
+            <a:gs pos="50000">
+              <a:schemeClr val="phClr">
+                <a:tint val="98000"/>
+                <a:satMod val="130000"/>
+                <a:shade val="90000"/>
+                <a:lumMod val="103000"/>
+              </a:schemeClr>
+            </a:gs>
+            <a:gs pos="100000">
+              <a:schemeClr val="phClr">
+                <a:shade val="63000"/>
+                <a:satMod val="120000"/>
+              </a:schemeClr>
+            </a:gs>
+          </a:gsLst>
+          <a:lin ang="5400000" scaled="0"/>
+        </a:gradFill>
+      </a:bgFillStyleLst>
+    </a:fmtScheme>
+  </a:themeElements>
+  <a:objectDefaults/>
+  <a:extraClrSchemeLst/>
+  <a:extLst>
+    <a:ext uri="{05A4C25C-085E-4340-85A3-A5531E510DB2}">
+      <thm15:themeFamily xmlns:thm15="http://schemas.microsoft.com/office/thememl/2012/main" name="Office Theme" id="{62F939B6-93AF-4DB8-9C6B-D6C7DFDC589F}" vid="{4A3C46E8-61CC-4603-A589-7422A47A8E4A}"/>
+    </a:ext>
+  </a:extLst>
+</a:theme>
 </file>
</xml_diff>

<commit_message>
Adding comparision table, and going to finish
</commit_message>
<xml_diff>
--- a/kochanek_ndr_prezentace.pptx
+++ b/kochanek_ndr_prezentace.pptx
@@ -5,7 +5,7 @@
     <p:sldMasterId id="2147483672" r:id="rId1"/>
   </p:sldMasterIdLst>
   <p:notesMasterIdLst>
-    <p:notesMasterId r:id="rId17"/>
+    <p:notesMasterId r:id="rId18"/>
   </p:notesMasterIdLst>
   <p:sldIdLst>
     <p:sldId id="256" r:id="rId2"/>
@@ -17,26 +17,27 @@
     <p:sldId id="266" r:id="rId8"/>
     <p:sldId id="271" r:id="rId9"/>
     <p:sldId id="278" r:id="rId10"/>
-    <p:sldId id="272" r:id="rId11"/>
-    <p:sldId id="279" r:id="rId12"/>
-    <p:sldId id="267" r:id="rId13"/>
-    <p:sldId id="263" r:id="rId14"/>
-    <p:sldId id="265" r:id="rId15"/>
-    <p:sldId id="275" r:id="rId16"/>
+    <p:sldId id="282" r:id="rId11"/>
+    <p:sldId id="272" r:id="rId12"/>
+    <p:sldId id="279" r:id="rId13"/>
+    <p:sldId id="267" r:id="rId14"/>
+    <p:sldId id="263" r:id="rId15"/>
+    <p:sldId id="265" r:id="rId16"/>
+    <p:sldId id="275" r:id="rId17"/>
   </p:sldIdLst>
   <p:sldSz cx="9144000" cy="6858000" type="screen4x3"/>
   <p:notesSz cx="6858000" cy="9144000"/>
   <p:embeddedFontLst>
     <p:embeddedFont>
       <p:font typeface="Technika" panose="020B0604020202020204" charset="0"/>
-      <p:regular r:id="rId18"/>
-      <p:bold r:id="rId19"/>
-      <p:italic r:id="rId20"/>
-      <p:boldItalic r:id="rId21"/>
+      <p:regular r:id="rId19"/>
+      <p:bold r:id="rId20"/>
+      <p:italic r:id="rId21"/>
+      <p:boldItalic r:id="rId22"/>
     </p:embeddedFont>
     <p:embeddedFont>
       <p:font typeface="Technika-Bold" panose="00000600000000000000" charset="0"/>
-      <p:regular r:id="rId22"/>
+      <p:regular r:id="rId23"/>
     </p:embeddedFont>
   </p:embeddedFontLst>
   <p:defaultTextStyle>
@@ -1876,6 +1877,741 @@
   <p:cSld>
     <p:spTree>
       <p:nvGrpSpPr>
+        <p:cNvPr id="1" name=""/>
+        <p:cNvGrpSpPr/>
+        <p:nvPr/>
+      </p:nvGrpSpPr>
+      <p:grpSpPr>
+        <a:xfrm>
+          <a:off x="0" y="0"/>
+          <a:ext cx="0" cy="0"/>
+          <a:chOff x="0" y="0"/>
+          <a:chExt cx="0" cy="0"/>
+        </a:xfrm>
+      </p:grpSpPr>
+      <p:sp>
+        <p:nvSpPr>
+          <p:cNvPr id="2" name="Zástupný obsah 1">
+            <a:extLst>
+              <a:ext uri="{FF2B5EF4-FFF2-40B4-BE49-F238E27FC236}">
+                <a16:creationId xmlns:a16="http://schemas.microsoft.com/office/drawing/2014/main" id="{ED004470-B7E3-6C2A-C00E-059C7850867C}"/>
+              </a:ext>
+            </a:extLst>
+          </p:cNvPr>
+          <p:cNvSpPr>
+            <a:spLocks noGrp="1"/>
+          </p:cNvSpPr>
+          <p:nvPr>
+            <p:ph idx="1"/>
+          </p:nvPr>
+        </p:nvSpPr>
+        <p:spPr/>
+        <p:txBody>
+          <a:bodyPr/>
+          <a:lstStyle/>
+          <a:p>
+            <a:endParaRPr lang="en-US" dirty="0"/>
+          </a:p>
+        </p:txBody>
+      </p:sp>
+      <p:sp>
+        <p:nvSpPr>
+          <p:cNvPr id="3" name="Title 1">
+            <a:extLst>
+              <a:ext uri="{FF2B5EF4-FFF2-40B4-BE49-F238E27FC236}">
+                <a16:creationId xmlns:a16="http://schemas.microsoft.com/office/drawing/2014/main" id="{D09EB834-37BB-7293-3FE8-3C5CA5DE7059}"/>
+              </a:ext>
+            </a:extLst>
+          </p:cNvPr>
+          <p:cNvSpPr txBox="1">
+            <a:spLocks/>
+          </p:cNvSpPr>
+          <p:nvPr/>
+        </p:nvSpPr>
+        <p:spPr>
+          <a:xfrm>
+            <a:off x="2120235" y="508276"/>
+            <a:ext cx="7736694" cy="1446663"/>
+          </a:xfrm>
+          <a:prstGeom prst="rect">
+            <a:avLst/>
+          </a:prstGeom>
+        </p:spPr>
+        <p:txBody>
+          <a:bodyPr/>
+          <a:lstStyle>
+            <a:lvl1pPr algn="l" defTabSz="914354" rtl="0" eaLnBrk="1" latinLnBrk="0" hangingPunct="1">
+              <a:lnSpc>
+                <a:spcPct val="90000"/>
+              </a:lnSpc>
+              <a:spcBef>
+                <a:spcPct val="0"/>
+              </a:spcBef>
+              <a:buNone/>
+              <a:defRPr sz="4400" kern="1200">
+                <a:solidFill>
+                  <a:schemeClr val="tx1"/>
+                </a:solidFill>
+                <a:latin typeface="Technika-Bold" panose="00000600000000000000" pitchFamily="50" charset="-18"/>
+                <a:ea typeface="+mj-ea"/>
+                <a:cs typeface="+mj-cs"/>
+              </a:defRPr>
+            </a:lvl1pPr>
+          </a:lstStyle>
+          <a:p>
+            <a:r>
+              <a:rPr lang="cs-CZ" dirty="0"/>
+              <a:t>Porovnání</a:t>
+            </a:r>
+          </a:p>
+        </p:txBody>
+      </p:sp>
+      <p:graphicFrame>
+        <p:nvGraphicFramePr>
+          <p:cNvPr id="6" name="Tabulka 5">
+            <a:extLst>
+              <a:ext uri="{FF2B5EF4-FFF2-40B4-BE49-F238E27FC236}">
+                <a16:creationId xmlns:a16="http://schemas.microsoft.com/office/drawing/2014/main" id="{DEA870BB-47E8-67D1-F65C-C4B7E358805B}"/>
+              </a:ext>
+            </a:extLst>
+          </p:cNvPr>
+          <p:cNvGraphicFramePr>
+            <a:graphicFrameLocks noGrp="1"/>
+          </p:cNvGraphicFramePr>
+          <p:nvPr>
+            <p:extLst>
+              <p:ext uri="{D42A27DB-BD31-4B8C-83A1-F6EECF244321}">
+                <p14:modId xmlns:p14="http://schemas.microsoft.com/office/powerpoint/2010/main" val="1776521999"/>
+              </p:ext>
+            </p:extLst>
+          </p:nvPr>
+        </p:nvGraphicFramePr>
+        <p:xfrm>
+          <a:off x="1116448" y="1191541"/>
+          <a:ext cx="6911103" cy="5158183"/>
+        </p:xfrm>
+        <a:graphic>
+          <a:graphicData uri="http://schemas.openxmlformats.org/drawingml/2006/table">
+            <a:tbl>
+              <a:tblPr firstRow="1" bandRow="1">
+                <a:tableStyleId>{5C22544A-7EE6-4342-B048-85BDC9FD1C3A}</a:tableStyleId>
+              </a:tblPr>
+              <a:tblGrid>
+                <a:gridCol w="2047969">
+                  <a:extLst>
+                    <a:ext uri="{9D8B030D-6E8A-4147-A177-3AD203B41FA5}">
+                      <a16:colId xmlns:a16="http://schemas.microsoft.com/office/drawing/2014/main" val="3451276597"/>
+                    </a:ext>
+                  </a:extLst>
+                </a:gridCol>
+                <a:gridCol w="2559434">
+                  <a:extLst>
+                    <a:ext uri="{9D8B030D-6E8A-4147-A177-3AD203B41FA5}">
+                      <a16:colId xmlns:a16="http://schemas.microsoft.com/office/drawing/2014/main" val="447182860"/>
+                    </a:ext>
+                  </a:extLst>
+                </a:gridCol>
+                <a:gridCol w="2303700">
+                  <a:extLst>
+                    <a:ext uri="{9D8B030D-6E8A-4147-A177-3AD203B41FA5}">
+                      <a16:colId xmlns:a16="http://schemas.microsoft.com/office/drawing/2014/main" val="212837208"/>
+                    </a:ext>
+                  </a:extLst>
+                </a:gridCol>
+              </a:tblGrid>
+              <a:tr h="396332">
+                <a:tc>
+                  <a:txBody>
+                    <a:bodyPr/>
+                    <a:lstStyle/>
+                    <a:p>
+                      <a:r>
+                        <a:rPr lang="cs-CZ" dirty="0"/>
+                        <a:t>Kritérium</a:t>
+                      </a:r>
+                      <a:endParaRPr lang="en-US" dirty="0"/>
+                    </a:p>
+                  </a:txBody>
+                  <a:tcPr/>
+                </a:tc>
+                <a:tc>
+                  <a:txBody>
+                    <a:bodyPr/>
+                    <a:lstStyle/>
+                    <a:p>
+                      <a:r>
+                        <a:rPr lang="cs-CZ" dirty="0" err="1"/>
+                        <a:t>FortiNDR</a:t>
+                      </a:r>
+                      <a:endParaRPr lang="en-US" dirty="0"/>
+                    </a:p>
+                  </a:txBody>
+                  <a:tcPr/>
+                </a:tc>
+                <a:tc>
+                  <a:txBody>
+                    <a:bodyPr/>
+                    <a:lstStyle/>
+                    <a:p>
+                      <a:r>
+                        <a:rPr lang="cs-CZ" dirty="0" err="1"/>
+                        <a:t>Suricata+Zeek</a:t>
+                      </a:r>
+                      <a:endParaRPr lang="en-US" dirty="0"/>
+                    </a:p>
+                  </a:txBody>
+                  <a:tcPr/>
+                </a:tc>
+                <a:extLst>
+                  <a:ext uri="{0D108BD9-81ED-4DB2-BD59-A6C34878D82A}">
+                    <a16:rowId xmlns:a16="http://schemas.microsoft.com/office/drawing/2014/main" val="3872855694"/>
+                  </a:ext>
+                </a:extLst>
+              </a:tr>
+              <a:tr h="880616">
+                <a:tc>
+                  <a:txBody>
+                    <a:bodyPr/>
+                    <a:lstStyle/>
+                    <a:p>
+                      <a:pPr fontAlgn="base"/>
+                      <a:r>
+                        <a:rPr lang="en-US" sz="1600" b="1" dirty="0" err="1">
+                          <a:effectLst/>
+                        </a:rPr>
+                        <a:t>Efektivita</a:t>
+                      </a:r>
+                      <a:endParaRPr lang="en-US" sz="1600" dirty="0">
+                        <a:effectLst/>
+                      </a:endParaRPr>
+                    </a:p>
+                  </a:txBody>
+                  <a:tcPr anchor="ctr"/>
+                </a:tc>
+                <a:tc>
+                  <a:txBody>
+                    <a:bodyPr/>
+                    <a:lstStyle/>
+                    <a:p>
+                      <a:pPr fontAlgn="base"/>
+                      <a:r>
+                        <a:rPr lang="en-US" sz="1600">
+                          <a:effectLst/>
+                        </a:rPr>
+                        <a:t>Integrované AI algoritmy</a:t>
+                      </a:r>
+                    </a:p>
+                  </a:txBody>
+                  <a:tcPr anchor="ctr"/>
+                </a:tc>
+                <a:tc>
+                  <a:txBody>
+                    <a:bodyPr/>
+                    <a:lstStyle/>
+                    <a:p>
+                      <a:pPr fontAlgn="base"/>
+                      <a:r>
+                        <a:rPr lang="en-US" sz="1600">
+                          <a:effectLst/>
+                        </a:rPr>
+                        <a:t>Vyžaduje ladění, ale velmi přizpůsobivé</a:t>
+                      </a:r>
+                    </a:p>
+                  </a:txBody>
+                  <a:tcPr anchor="ctr"/>
+                </a:tc>
+                <a:extLst>
+                  <a:ext uri="{0D108BD9-81ED-4DB2-BD59-A6C34878D82A}">
+                    <a16:rowId xmlns:a16="http://schemas.microsoft.com/office/drawing/2014/main" val="3990874855"/>
+                  </a:ext>
+                </a:extLst>
+              </a:tr>
+              <a:tr h="1141540">
+                <a:tc>
+                  <a:txBody>
+                    <a:bodyPr/>
+                    <a:lstStyle/>
+                    <a:p>
+                      <a:pPr fontAlgn="base"/>
+                      <a:r>
+                        <a:rPr lang="en-US" sz="1600" b="1" dirty="0" err="1">
+                          <a:effectLst/>
+                        </a:rPr>
+                        <a:t>Výkon</a:t>
+                      </a:r>
+                      <a:endParaRPr lang="en-US" sz="1600" dirty="0">
+                        <a:effectLst/>
+                      </a:endParaRPr>
+                    </a:p>
+                  </a:txBody>
+                  <a:tcPr anchor="ctr"/>
+                </a:tc>
+                <a:tc>
+                  <a:txBody>
+                    <a:bodyPr/>
+                    <a:lstStyle/>
+                    <a:p>
+                      <a:pPr fontAlgn="base"/>
+                      <a:r>
+                        <a:rPr lang="en-US" sz="1600" dirty="0" err="1">
+                          <a:effectLst/>
+                        </a:rPr>
+                        <a:t>Rychlá</a:t>
+                      </a:r>
+                      <a:r>
+                        <a:rPr lang="en-US" sz="1600" dirty="0">
+                          <a:effectLst/>
+                        </a:rPr>
+                        <a:t> </a:t>
+                      </a:r>
+                      <a:r>
+                        <a:rPr lang="en-US" sz="1600" dirty="0" err="1">
+                          <a:effectLst/>
+                        </a:rPr>
+                        <a:t>analýza</a:t>
+                      </a:r>
+                      <a:r>
+                        <a:rPr lang="en-US" sz="1600" dirty="0">
+                          <a:effectLst/>
+                        </a:rPr>
+                        <a:t> a </a:t>
+                      </a:r>
+                      <a:r>
+                        <a:rPr lang="en-US" sz="1600" dirty="0" err="1">
+                          <a:effectLst/>
+                        </a:rPr>
+                        <a:t>reakce</a:t>
+                      </a:r>
+                      <a:endParaRPr lang="en-US" sz="1600" dirty="0">
+                        <a:effectLst/>
+                      </a:endParaRPr>
+                    </a:p>
+                  </a:txBody>
+                  <a:tcPr anchor="ctr"/>
+                </a:tc>
+                <a:tc>
+                  <a:txBody>
+                    <a:bodyPr/>
+                    <a:lstStyle/>
+                    <a:p>
+                      <a:pPr fontAlgn="base"/>
+                      <a:r>
+                        <a:rPr lang="pl-PL" sz="1600" dirty="0">
+                          <a:effectLst/>
+                        </a:rPr>
+                        <a:t>Závisí na konfiguraci, podpora velkých sítí</a:t>
+                      </a:r>
+                    </a:p>
+                  </a:txBody>
+                  <a:tcPr anchor="ctr"/>
+                </a:tc>
+                <a:extLst>
+                  <a:ext uri="{0D108BD9-81ED-4DB2-BD59-A6C34878D82A}">
+                    <a16:rowId xmlns:a16="http://schemas.microsoft.com/office/drawing/2014/main" val="1594717210"/>
+                  </a:ext>
+                </a:extLst>
+              </a:tr>
+              <a:tr h="619693">
+                <a:tc>
+                  <a:txBody>
+                    <a:bodyPr/>
+                    <a:lstStyle/>
+                    <a:p>
+                      <a:pPr fontAlgn="base"/>
+                      <a:r>
+                        <a:rPr lang="en-US" sz="1600" b="1">
+                          <a:effectLst/>
+                        </a:rPr>
+                        <a:t>Kompatibilita</a:t>
+                      </a:r>
+                      <a:endParaRPr lang="en-US" sz="1600">
+                        <a:effectLst/>
+                      </a:endParaRPr>
+                    </a:p>
+                  </a:txBody>
+                  <a:tcPr anchor="ctr"/>
+                </a:tc>
+                <a:tc>
+                  <a:txBody>
+                    <a:bodyPr/>
+                    <a:lstStyle/>
+                    <a:p>
+                      <a:pPr fontAlgn="base"/>
+                      <a:r>
+                        <a:rPr lang="en-US" sz="1600" dirty="0" err="1">
+                          <a:effectLst/>
+                        </a:rPr>
+                        <a:t>Nejlepší</a:t>
+                      </a:r>
+                      <a:r>
+                        <a:rPr lang="en-US" sz="1600" dirty="0">
+                          <a:effectLst/>
+                        </a:rPr>
+                        <a:t> s </a:t>
+                      </a:r>
+                      <a:r>
+                        <a:rPr lang="en-US" sz="1600" dirty="0" err="1">
+                          <a:effectLst/>
+                        </a:rPr>
+                        <a:t>produkty</a:t>
+                      </a:r>
+                      <a:r>
+                        <a:rPr lang="en-US" sz="1600" dirty="0">
+                          <a:effectLst/>
+                        </a:rPr>
+                        <a:t> Fortinet</a:t>
+                      </a:r>
+                    </a:p>
+                  </a:txBody>
+                  <a:tcPr anchor="ctr"/>
+                </a:tc>
+                <a:tc>
+                  <a:txBody>
+                    <a:bodyPr/>
+                    <a:lstStyle/>
+                    <a:p>
+                      <a:pPr fontAlgn="base"/>
+                      <a:r>
+                        <a:rPr lang="en-US" sz="1600" dirty="0" err="1">
+                          <a:effectLst/>
+                        </a:rPr>
+                        <a:t>Široká</a:t>
+                      </a:r>
+                      <a:r>
+                        <a:rPr lang="en-US" sz="1600" dirty="0">
+                          <a:effectLst/>
+                        </a:rPr>
+                        <a:t> s </a:t>
+                      </a:r>
+                      <a:r>
+                        <a:rPr lang="en-US" sz="1600" dirty="0" err="1">
+                          <a:effectLst/>
+                        </a:rPr>
+                        <a:t>různými</a:t>
+                      </a:r>
+                      <a:r>
+                        <a:rPr lang="en-US" sz="1600" dirty="0">
+                          <a:effectLst/>
+                        </a:rPr>
+                        <a:t> </a:t>
+                      </a:r>
+                      <a:r>
+                        <a:rPr lang="en-US" sz="1600" dirty="0" err="1">
+                          <a:effectLst/>
+                        </a:rPr>
+                        <a:t>nástroji</a:t>
+                      </a:r>
+                      <a:endParaRPr lang="en-US" sz="1600" dirty="0">
+                        <a:effectLst/>
+                      </a:endParaRPr>
+                    </a:p>
+                  </a:txBody>
+                  <a:tcPr anchor="ctr"/>
+                </a:tc>
+                <a:extLst>
+                  <a:ext uri="{0D108BD9-81ED-4DB2-BD59-A6C34878D82A}">
+                    <a16:rowId xmlns:a16="http://schemas.microsoft.com/office/drawing/2014/main" val="1705415568"/>
+                  </a:ext>
+                </a:extLst>
+              </a:tr>
+              <a:tr h="619693">
+                <a:tc>
+                  <a:txBody>
+                    <a:bodyPr/>
+                    <a:lstStyle/>
+                    <a:p>
+                      <a:pPr fontAlgn="base"/>
+                      <a:r>
+                        <a:rPr lang="en-US" sz="1600" b="1">
+                          <a:effectLst/>
+                        </a:rPr>
+                        <a:t>Uživatelská přívětivost</a:t>
+                      </a:r>
+                      <a:endParaRPr lang="en-US" sz="1600">
+                        <a:effectLst/>
+                      </a:endParaRPr>
+                    </a:p>
+                  </a:txBody>
+                  <a:tcPr anchor="ctr"/>
+                </a:tc>
+                <a:tc>
+                  <a:txBody>
+                    <a:bodyPr/>
+                    <a:lstStyle/>
+                    <a:p>
+                      <a:pPr fontAlgn="base"/>
+                      <a:r>
+                        <a:rPr lang="en-US" sz="1600" dirty="0" err="1">
+                          <a:effectLst/>
+                        </a:rPr>
+                        <a:t>Intuitivní</a:t>
+                      </a:r>
+                      <a:r>
+                        <a:rPr lang="en-US" sz="1600" dirty="0">
+                          <a:effectLst/>
+                        </a:rPr>
+                        <a:t> </a:t>
+                      </a:r>
+                      <a:r>
+                        <a:rPr lang="en-US" sz="1600" dirty="0" err="1">
+                          <a:effectLst/>
+                        </a:rPr>
+                        <a:t>rozhraní</a:t>
+                      </a:r>
+                      <a:endParaRPr lang="en-US" sz="1600" dirty="0">
+                        <a:effectLst/>
+                      </a:endParaRPr>
+                    </a:p>
+                  </a:txBody>
+                  <a:tcPr anchor="ctr"/>
+                </a:tc>
+                <a:tc>
+                  <a:txBody>
+                    <a:bodyPr/>
+                    <a:lstStyle/>
+                    <a:p>
+                      <a:pPr fontAlgn="base"/>
+                      <a:r>
+                        <a:rPr lang="en-US" sz="1600" dirty="0" err="1">
+                          <a:effectLst/>
+                        </a:rPr>
+                        <a:t>Vyžaduje</a:t>
+                      </a:r>
+                      <a:r>
+                        <a:rPr lang="en-US" sz="1600" dirty="0">
+                          <a:effectLst/>
+                        </a:rPr>
+                        <a:t> </a:t>
+                      </a:r>
+                      <a:r>
+                        <a:rPr lang="en-US" sz="1600" dirty="0" err="1">
+                          <a:effectLst/>
+                        </a:rPr>
+                        <a:t>technické</a:t>
+                      </a:r>
+                      <a:r>
+                        <a:rPr lang="en-US" sz="1600" dirty="0">
+                          <a:effectLst/>
+                        </a:rPr>
+                        <a:t> </a:t>
+                      </a:r>
+                      <a:r>
+                        <a:rPr lang="en-US" sz="1600" dirty="0" err="1">
+                          <a:effectLst/>
+                        </a:rPr>
+                        <a:t>znalosti</a:t>
+                      </a:r>
+                      <a:endParaRPr lang="en-US" sz="1600" dirty="0">
+                        <a:effectLst/>
+                      </a:endParaRPr>
+                    </a:p>
+                  </a:txBody>
+                  <a:tcPr anchor="ctr"/>
+                </a:tc>
+                <a:extLst>
+                  <a:ext uri="{0D108BD9-81ED-4DB2-BD59-A6C34878D82A}">
+                    <a16:rowId xmlns:a16="http://schemas.microsoft.com/office/drawing/2014/main" val="993083121"/>
+                  </a:ext>
+                </a:extLst>
+              </a:tr>
+              <a:tr h="880616">
+                <a:tc>
+                  <a:txBody>
+                    <a:bodyPr/>
+                    <a:lstStyle/>
+                    <a:p>
+                      <a:pPr fontAlgn="base"/>
+                      <a:r>
+                        <a:rPr lang="en-US" sz="1600" b="1">
+                          <a:effectLst/>
+                        </a:rPr>
+                        <a:t>Rozšířitelnost</a:t>
+                      </a:r>
+                      <a:endParaRPr lang="en-US" sz="1600">
+                        <a:effectLst/>
+                      </a:endParaRPr>
+                    </a:p>
+                  </a:txBody>
+                  <a:tcPr anchor="ctr"/>
+                </a:tc>
+                <a:tc>
+                  <a:txBody>
+                    <a:bodyPr/>
+                    <a:lstStyle/>
+                    <a:p>
+                      <a:pPr fontAlgn="base"/>
+                      <a:r>
+                        <a:rPr lang="en-US" sz="1600" dirty="0" err="1">
+                          <a:effectLst/>
+                        </a:rPr>
+                        <a:t>Omezená</a:t>
+                      </a:r>
+                      <a:r>
+                        <a:rPr lang="en-US" sz="1600" dirty="0">
+                          <a:effectLst/>
+                        </a:rPr>
+                        <a:t> </a:t>
+                      </a:r>
+                      <a:r>
+                        <a:rPr lang="en-US" sz="1600" dirty="0" err="1">
+                          <a:effectLst/>
+                        </a:rPr>
+                        <a:t>proprietární</a:t>
+                      </a:r>
+                      <a:r>
+                        <a:rPr lang="en-US" sz="1600" dirty="0">
+                          <a:effectLst/>
+                        </a:rPr>
+                        <a:t> </a:t>
+                      </a:r>
+                      <a:r>
+                        <a:rPr lang="en-US" sz="1600" dirty="0" err="1">
+                          <a:effectLst/>
+                        </a:rPr>
+                        <a:t>architekturou</a:t>
+                      </a:r>
+                      <a:endParaRPr lang="en-US" sz="1600" dirty="0">
+                        <a:effectLst/>
+                      </a:endParaRPr>
+                    </a:p>
+                  </a:txBody>
+                  <a:tcPr anchor="ctr"/>
+                </a:tc>
+                <a:tc>
+                  <a:txBody>
+                    <a:bodyPr/>
+                    <a:lstStyle/>
+                    <a:p>
+                      <a:pPr fontAlgn="base"/>
+                      <a:r>
+                        <a:rPr lang="en-US" sz="1600" dirty="0" err="1">
+                          <a:effectLst/>
+                        </a:rPr>
+                        <a:t>Vysoká</a:t>
+                      </a:r>
+                      <a:r>
+                        <a:rPr lang="en-US" sz="1600" dirty="0">
+                          <a:effectLst/>
+                        </a:rPr>
+                        <a:t>, </a:t>
+                      </a:r>
+                      <a:r>
+                        <a:rPr lang="en-US" sz="1600" dirty="0" err="1">
+                          <a:effectLst/>
+                        </a:rPr>
+                        <a:t>díky</a:t>
+                      </a:r>
+                      <a:r>
+                        <a:rPr lang="en-US" sz="1600" dirty="0">
+                          <a:effectLst/>
+                        </a:rPr>
+                        <a:t> </a:t>
+                      </a:r>
+                      <a:r>
+                        <a:rPr lang="cs-CZ" sz="1600" dirty="0">
+                          <a:effectLst/>
+                        </a:rPr>
+                        <a:t>open-source </a:t>
+                      </a:r>
+                      <a:r>
+                        <a:rPr lang="cs-CZ" sz="1600">
+                          <a:effectLst/>
+                        </a:rPr>
+                        <a:t>architektůře</a:t>
+                      </a:r>
+                      <a:endParaRPr lang="en-US" sz="1600" dirty="0">
+                        <a:effectLst/>
+                      </a:endParaRPr>
+                    </a:p>
+                  </a:txBody>
+                  <a:tcPr anchor="ctr"/>
+                </a:tc>
+                <a:extLst>
+                  <a:ext uri="{0D108BD9-81ED-4DB2-BD59-A6C34878D82A}">
+                    <a16:rowId xmlns:a16="http://schemas.microsoft.com/office/drawing/2014/main" val="472259119"/>
+                  </a:ext>
+                </a:extLst>
+              </a:tr>
+              <a:tr h="619693">
+                <a:tc>
+                  <a:txBody>
+                    <a:bodyPr/>
+                    <a:lstStyle/>
+                    <a:p>
+                      <a:pPr fontAlgn="base"/>
+                      <a:r>
+                        <a:rPr lang="en-US" sz="1600" b="1">
+                          <a:effectLst/>
+                        </a:rPr>
+                        <a:t>Náklady</a:t>
+                      </a:r>
+                      <a:endParaRPr lang="en-US" sz="1600">
+                        <a:effectLst/>
+                      </a:endParaRPr>
+                    </a:p>
+                  </a:txBody>
+                  <a:tcPr anchor="ctr"/>
+                </a:tc>
+                <a:tc>
+                  <a:txBody>
+                    <a:bodyPr/>
+                    <a:lstStyle/>
+                    <a:p>
+                      <a:pPr fontAlgn="base"/>
+                      <a:r>
+                        <a:rPr lang="en-US" sz="1600">
+                          <a:effectLst/>
+                        </a:rPr>
+                        <a:t>Vyšší kvůli licencím</a:t>
+                      </a:r>
+                    </a:p>
+                  </a:txBody>
+                  <a:tcPr anchor="ctr"/>
+                </a:tc>
+                <a:tc>
+                  <a:txBody>
+                    <a:bodyPr/>
+                    <a:lstStyle/>
+                    <a:p>
+                      <a:pPr fontAlgn="base"/>
+                      <a:r>
+                        <a:rPr lang="pl-PL" sz="1600" dirty="0">
+                          <a:effectLst/>
+                        </a:rPr>
+                        <a:t>Nižší, potenciálně vyšší za podporu</a:t>
+                      </a:r>
+                    </a:p>
+                  </a:txBody>
+                  <a:tcPr anchor="ctr"/>
+                </a:tc>
+                <a:extLst>
+                  <a:ext uri="{0D108BD9-81ED-4DB2-BD59-A6C34878D82A}">
+                    <a16:rowId xmlns:a16="http://schemas.microsoft.com/office/drawing/2014/main" val="4159130703"/>
+                  </a:ext>
+                </a:extLst>
+              </a:tr>
+            </a:tbl>
+          </a:graphicData>
+        </a:graphic>
+      </p:graphicFrame>
+    </p:spTree>
+    <p:extLst>
+      <p:ext uri="{BB962C8B-B14F-4D97-AF65-F5344CB8AC3E}">
+        <p14:creationId xmlns:p14="http://schemas.microsoft.com/office/powerpoint/2010/main" val="3054506371"/>
+      </p:ext>
+    </p:extLst>
+  </p:cSld>
+  <p:clrMapOvr>
+    <a:masterClrMapping/>
+  </p:clrMapOvr>
+</p:sld>
+</file>
+
+<file path=ppt/slides/slide11.xml><?xml version="1.0" encoding="utf-8"?>
+<p:sld xmlns:a="http://schemas.openxmlformats.org/drawingml/2006/main" xmlns:r="http://schemas.openxmlformats.org/officeDocument/2006/relationships" xmlns:p="http://schemas.openxmlformats.org/presentationml/2006/main">
+  <p:cSld>
+    <p:spTree>
+      <p:nvGrpSpPr>
         <p:cNvPr id="1" name="">
           <a:extLst>
             <a:ext uri="{FF2B5EF4-FFF2-40B4-BE49-F238E27FC236}">
@@ -1988,8 +2724,16 @@
               <a:t>Strategicky um</a:t>
             </a:r>
             <a:r>
+              <a:rPr lang="cs-CZ" dirty="0" err="1"/>
+              <a:t>ístě</a:t>
+            </a:r>
+            <a:r>
+              <a:rPr lang="en-US" dirty="0"/>
+              <a:t>n</a:t>
+            </a:r>
+            <a:r>
               <a:rPr lang="cs-CZ" dirty="0"/>
-              <a:t>ístěň na perimetr sítě a na klíčové body</a:t>
+              <a:t> na perimetr sítě a na klíčové body</a:t>
             </a:r>
             <a:endParaRPr lang="en-US" dirty="0"/>
           </a:p>
@@ -2011,7 +2755,7 @@
 </p:sld>
 </file>
 
-<file path=ppt/slides/slide11.xml><?xml version="1.0" encoding="utf-8"?>
+<file path=ppt/slides/slide12.xml><?xml version="1.0" encoding="utf-8"?>
 <p:sld xmlns:a="http://schemas.openxmlformats.org/drawingml/2006/main" xmlns:r="http://schemas.openxmlformats.org/officeDocument/2006/relationships" xmlns:p="http://schemas.openxmlformats.org/presentationml/2006/main">
   <p:cSld>
     <p:spTree>
@@ -2095,46 +2839,24 @@
           <a:p>
             <a:r>
               <a:rPr lang="cs-CZ" dirty="0"/>
-              <a:t>Pro Firewall:</a:t>
+              <a:t>Pro NDR:</a:t>
             </a:r>
           </a:p>
           <a:p>
             <a:r>
               <a:rPr lang="cs-CZ" dirty="0"/>
-              <a:t>NGFW – Next Generation Firewall </a:t>
-            </a:r>
+              <a:t>Komplexní řešení s pokročilou analýzou a ML pro identifikaci anomálií a hrozeb</a:t>
+            </a:r>
+            <a:endParaRPr lang="en-US" dirty="0"/>
+          </a:p>
+          <a:p>
+            <a:endParaRPr lang="en-US" dirty="0"/>
           </a:p>
           <a:p>
             <a:r>
               <a:rPr lang="cs-CZ" dirty="0"/>
-              <a:t>S fu</a:t>
-            </a:r>
-            <a:r>
-              <a:rPr lang="en-US" dirty="0"/>
-              <a:t>n</a:t>
-            </a:r>
-            <a:r>
-              <a:rPr lang="cs-CZ" dirty="0"/>
-              <a:t>kcionalitami jako Deep Packet Inspection a App Filtering</a:t>
-            </a:r>
-            <a:endParaRPr lang="en-US" dirty="0"/>
-          </a:p>
-          <a:p>
-            <a:endParaRPr lang="en-US" dirty="0"/>
-          </a:p>
-          <a:p>
-            <a:r>
-              <a:rPr lang="en-US" dirty="0"/>
-              <a:t>Strategicky um</a:t>
-            </a:r>
-            <a:r>
-              <a:rPr lang="cs-CZ" dirty="0"/>
-              <a:t>ístěň na perimetr sítě a na klíčové body</a:t>
-            </a:r>
-            <a:endParaRPr lang="en-US" dirty="0"/>
-          </a:p>
-          <a:p>
-            <a:endParaRPr lang="cs-CZ" dirty="0"/>
+              <a:t>Integrace s firewallem pro rychlou reakci a aktualizaci pravidel</a:t>
+            </a:r>
           </a:p>
         </p:txBody>
       </p:sp>
@@ -2151,7 +2873,7 @@
 </p:sld>
 </file>
 
-<file path=ppt/slides/slide12.xml><?xml version="1.0" encoding="utf-8"?>
+<file path=ppt/slides/slide13.xml><?xml version="1.0" encoding="utf-8"?>
 <p:sld xmlns:a="http://schemas.openxmlformats.org/drawingml/2006/main" xmlns:r="http://schemas.openxmlformats.org/officeDocument/2006/relationships" xmlns:p="http://schemas.openxmlformats.org/presentationml/2006/main">
   <p:cSld>
     <p:spTree>
@@ -2250,7 +2972,7 @@
 </p:sld>
 </file>
 
-<file path=ppt/slides/slide13.xml><?xml version="1.0" encoding="utf-8"?>
+<file path=ppt/slides/slide14.xml><?xml version="1.0" encoding="utf-8"?>
 <p:sld xmlns:a="http://schemas.openxmlformats.org/drawingml/2006/main" xmlns:r="http://schemas.openxmlformats.org/officeDocument/2006/relationships" xmlns:p="http://schemas.openxmlformats.org/presentationml/2006/main">
   <p:cSld>
     <p:spTree>
@@ -2338,7 +3060,7 @@
 </p:sld>
 </file>
 
-<file path=ppt/slides/slide14.xml><?xml version="1.0" encoding="utf-8"?>
+<file path=ppt/slides/slide15.xml><?xml version="1.0" encoding="utf-8"?>
 <p:sld xmlns:a="http://schemas.openxmlformats.org/drawingml/2006/main" xmlns:r="http://schemas.openxmlformats.org/officeDocument/2006/relationships" xmlns:p="http://schemas.openxmlformats.org/presentationml/2006/main">
   <p:cSld>
     <p:spTree>
@@ -2401,7 +3123,7 @@
 </p:sld>
 </file>
 
-<file path=ppt/slides/slide15.xml><?xml version="1.0" encoding="utf-8"?>
+<file path=ppt/slides/slide16.xml><?xml version="1.0" encoding="utf-8"?>
 <p:sld xmlns:a="http://schemas.openxmlformats.org/drawingml/2006/main" xmlns:r="http://schemas.openxmlformats.org/officeDocument/2006/relationships" xmlns:p="http://schemas.openxmlformats.org/presentationml/2006/main">
   <p:cSld>
     <p:spTree>
@@ -3517,15 +4239,7 @@
           <a:p>
             <a:r>
               <a:rPr lang="cs-CZ" dirty="0"/>
-              <a:t>NDR – Network </a:t>
-            </a:r>
-            <a:r>
-              <a:rPr lang="cs-CZ" dirty="0" err="1"/>
-              <a:t>Detection</a:t>
-            </a:r>
-            <a:r>
-              <a:rPr lang="cs-CZ" dirty="0"/>
-              <a:t> and Response</a:t>
+              <a:t>NDR – Network Detection and Response</a:t>
             </a:r>
           </a:p>
         </p:txBody>
@@ -3805,19 +4519,19 @@
           <a:p>
             <a:r>
               <a:rPr lang="cs-CZ" dirty="0"/>
-              <a:t>Stanovíme si vlastní formát a obsah dat</a:t>
+              <a:t>Stanovujeme formát a obsah dat</a:t>
             </a:r>
           </a:p>
           <a:p>
             <a:r>
               <a:rPr lang="cs-CZ" dirty="0"/>
-              <a:t>Také se věnujeme vytvoření bezpečnostní politiky</a:t>
-            </a:r>
-          </a:p>
-          <a:p>
-            <a:r>
-              <a:rPr lang="cs-CZ" dirty="0"/>
-              <a:t>Použití </a:t>
+              <a:t>Vytváříme bezpečnostní politiku</a:t>
+            </a:r>
+          </a:p>
+          <a:p>
+            <a:r>
+              <a:rPr lang="it-IT" dirty="0"/>
+              <a:t>Pro NDR používám </a:t>
             </a:r>
             <a:r>
               <a:rPr lang="cs-CZ" dirty="0" err="1">
@@ -3827,7 +4541,7 @@
             </a:r>
             <a:r>
               <a:rPr lang="cs-CZ" dirty="0"/>
-              <a:t>, </a:t>
+              <a:t> a </a:t>
             </a:r>
             <a:r>
               <a:rPr lang="cs-CZ" dirty="0" err="1">
@@ -3835,15 +4549,12 @@
               </a:rPr>
               <a:t>Suricata</a:t>
             </a:r>
+            <a:endParaRPr lang="cs-CZ" dirty="0"/>
+          </a:p>
+          <a:p>
             <a:r>
               <a:rPr lang="cs-CZ" dirty="0"/>
-              <a:t> pro NDR</a:t>
-            </a:r>
-          </a:p>
-          <a:p>
-            <a:r>
-              <a:rPr lang="cs-CZ" dirty="0"/>
-              <a:t>Pro další komponenty jako SOAR a SIEM také existují open-source varianty co si </a:t>
+              <a:t>SOAR a SIEM jsou open-source a </a:t>
             </a:r>
             <a:r>
               <a:rPr lang="cs-CZ" dirty="0" err="1"/>
@@ -3851,7 +4562,7 @@
             </a:r>
             <a:r>
               <a:rPr lang="cs-CZ" dirty="0"/>
-              <a:t>-hostujeme</a:t>
+              <a:t>-hostované, ale mimo rozsah tohoto projektu</a:t>
             </a:r>
           </a:p>
         </p:txBody>

</xml_diff>

<commit_message>
coming to finish, only implementation tips will follow
</commit_message>
<xml_diff>
--- a/kochanek_ndr_prezentace.pptx
+++ b/kochanek_ndr_prezentace.pptx
@@ -5,7 +5,7 @@
     <p:sldMasterId id="2147483672" r:id="rId1"/>
   </p:sldMasterIdLst>
   <p:notesMasterIdLst>
-    <p:notesMasterId r:id="rId18"/>
+    <p:notesMasterId r:id="rId19"/>
   </p:notesMasterIdLst>
   <p:sldIdLst>
     <p:sldId id="256" r:id="rId2"/>
@@ -21,23 +21,24 @@
     <p:sldId id="272" r:id="rId12"/>
     <p:sldId id="279" r:id="rId13"/>
     <p:sldId id="267" r:id="rId14"/>
-    <p:sldId id="263" r:id="rId15"/>
-    <p:sldId id="265" r:id="rId16"/>
-    <p:sldId id="275" r:id="rId17"/>
+    <p:sldId id="283" r:id="rId15"/>
+    <p:sldId id="263" r:id="rId16"/>
+    <p:sldId id="265" r:id="rId17"/>
+    <p:sldId id="275" r:id="rId18"/>
   </p:sldIdLst>
   <p:sldSz cx="9144000" cy="6858000" type="screen4x3"/>
   <p:notesSz cx="6858000" cy="9144000"/>
   <p:embeddedFontLst>
     <p:embeddedFont>
       <p:font typeface="Technika" panose="020B0604020202020204" charset="0"/>
-      <p:regular r:id="rId19"/>
-      <p:bold r:id="rId20"/>
-      <p:italic r:id="rId21"/>
-      <p:boldItalic r:id="rId22"/>
+      <p:regular r:id="rId20"/>
+      <p:bold r:id="rId21"/>
+      <p:italic r:id="rId22"/>
+      <p:boldItalic r:id="rId23"/>
     </p:embeddedFont>
     <p:embeddedFont>
       <p:font typeface="Technika-Bold" panose="00000600000000000000" charset="0"/>
-      <p:regular r:id="rId23"/>
+      <p:regular r:id="rId24"/>
     </p:embeddedFont>
   </p:embeddedFontLst>
   <p:defaultTextStyle>
@@ -1981,19 +1982,19 @@
           <p:nvPr>
             <p:extLst>
               <p:ext uri="{D42A27DB-BD31-4B8C-83A1-F6EECF244321}">
-                <p14:modId xmlns:p14="http://schemas.microsoft.com/office/powerpoint/2010/main" val="1776521999"/>
+                <p14:modId xmlns:p14="http://schemas.microsoft.com/office/powerpoint/2010/main" val="234651831"/>
               </p:ext>
             </p:extLst>
           </p:nvPr>
         </p:nvGraphicFramePr>
         <p:xfrm>
           <a:off x="1116448" y="1191541"/>
-          <a:ext cx="6911103" cy="5158183"/>
+          <a:ext cx="6911103" cy="4836638"/>
         </p:xfrm>
         <a:graphic>
           <a:graphicData uri="http://schemas.openxmlformats.org/drawingml/2006/table">
             <a:tbl>
-              <a:tblPr firstRow="1" bandRow="1">
+              <a:tblPr firstRow="1" firstCol="1" bandRow="1">
                 <a:tableStyleId>{5C22544A-7EE6-4342-B048-85BDC9FD1C3A}</a:tableStyleId>
               </a:tblPr>
               <a:tblGrid>
@@ -2095,49 +2096,22 @@
                     <a:p>
                       <a:pPr fontAlgn="base"/>
                       <a:r>
-                        <a:rPr lang="en-US" sz="1600">
+                        <a:rPr lang="en-US" sz="1600" dirty="0" err="1">
                           <a:effectLst/>
                         </a:rPr>
-                        <a:t>Integrované AI algoritmy</a:t>
-                      </a:r>
-                    </a:p>
-                  </a:txBody>
-                  <a:tcPr anchor="ctr"/>
-                </a:tc>
-                <a:tc>
-                  <a:txBody>
-                    <a:bodyPr/>
-                    <a:lstStyle/>
-                    <a:p>
-                      <a:pPr fontAlgn="base"/>
-                      <a:r>
-                        <a:rPr lang="en-US" sz="1600">
+                        <a:t>Integrované</a:t>
+                      </a:r>
+                      <a:r>
+                        <a:rPr lang="en-US" sz="1600" dirty="0">
                           <a:effectLst/>
                         </a:rPr>
-                        <a:t>Vyžaduje ladění, ale velmi přizpůsobivé</a:t>
-                      </a:r>
-                    </a:p>
-                  </a:txBody>
-                  <a:tcPr anchor="ctr"/>
-                </a:tc>
-                <a:extLst>
-                  <a:ext uri="{0D108BD9-81ED-4DB2-BD59-A6C34878D82A}">
-                    <a16:rowId xmlns:a16="http://schemas.microsoft.com/office/drawing/2014/main" val="3990874855"/>
-                  </a:ext>
-                </a:extLst>
-              </a:tr>
-              <a:tr h="1141540">
-                <a:tc>
-                  <a:txBody>
-                    <a:bodyPr/>
-                    <a:lstStyle/>
-                    <a:p>
-                      <a:pPr fontAlgn="base"/>
-                      <a:r>
-                        <a:rPr lang="en-US" sz="1600" b="1" dirty="0" err="1">
+                        <a:t> AI </a:t>
+                      </a:r>
+                      <a:r>
+                        <a:rPr lang="en-US" sz="1600" dirty="0" err="1">
                           <a:effectLst/>
                         </a:rPr>
-                        <a:t>Výkon</a:t>
+                        <a:t>algoritmy</a:t>
                       </a:r>
                       <a:endParaRPr lang="en-US" sz="1600" dirty="0">
                         <a:effectLst/>
@@ -2156,7 +2130,7 @@
                         <a:rPr lang="en-US" sz="1600" dirty="0" err="1">
                           <a:effectLst/>
                         </a:rPr>
-                        <a:t>Rychlá</a:t>
+                        <a:t>Vyžaduje</a:t>
                       </a:r>
                       <a:r>
                         <a:rPr lang="en-US" sz="1600" dirty="0">
@@ -2168,19 +2142,57 @@
                         <a:rPr lang="en-US" sz="1600" dirty="0" err="1">
                           <a:effectLst/>
                         </a:rPr>
-                        <a:t>analýza</a:t>
+                        <a:t>ladění</a:t>
                       </a:r>
                       <a:r>
                         <a:rPr lang="en-US" sz="1600" dirty="0">
                           <a:effectLst/>
                         </a:rPr>
-                        <a:t> a </a:t>
+                        <a:t>, ale </a:t>
                       </a:r>
                       <a:r>
                         <a:rPr lang="en-US" sz="1600" dirty="0" err="1">
                           <a:effectLst/>
                         </a:rPr>
-                        <a:t>reakce</a:t>
+                        <a:t>velmi</a:t>
+                      </a:r>
+                      <a:r>
+                        <a:rPr lang="en-US" sz="1600" dirty="0">
+                          <a:effectLst/>
+                        </a:rPr>
+                        <a:t> </a:t>
+                      </a:r>
+                      <a:r>
+                        <a:rPr lang="en-US" sz="1600" dirty="0" err="1">
+                          <a:effectLst/>
+                        </a:rPr>
+                        <a:t>přizpůsobivé</a:t>
+                      </a:r>
+                      <a:endParaRPr lang="en-US" sz="1600" dirty="0">
+                        <a:effectLst/>
+                      </a:endParaRPr>
+                    </a:p>
+                  </a:txBody>
+                  <a:tcPr anchor="ctr"/>
+                </a:tc>
+                <a:extLst>
+                  <a:ext uri="{0D108BD9-81ED-4DB2-BD59-A6C34878D82A}">
+                    <a16:rowId xmlns:a16="http://schemas.microsoft.com/office/drawing/2014/main" val="3990874855"/>
+                  </a:ext>
+                </a:extLst>
+              </a:tr>
+              <a:tr h="819995">
+                <a:tc>
+                  <a:txBody>
+                    <a:bodyPr/>
+                    <a:lstStyle/>
+                    <a:p>
+                      <a:pPr fontAlgn="base"/>
+                      <a:r>
+                        <a:rPr lang="en-US" sz="1600" b="1" dirty="0" err="1">
+                          <a:effectLst/>
+                        </a:rPr>
+                        <a:t>Výkon</a:t>
                       </a:r>
                       <a:endParaRPr lang="en-US" sz="1600" dirty="0">
                         <a:effectLst/>
@@ -2196,10 +2208,53 @@
                     <a:p>
                       <a:pPr fontAlgn="base"/>
                       <a:r>
+                        <a:rPr lang="en-US" sz="1600" dirty="0" err="1">
+                          <a:effectLst/>
+                        </a:rPr>
+                        <a:t>Rychlá</a:t>
+                      </a:r>
+                      <a:r>
+                        <a:rPr lang="en-US" sz="1600" dirty="0">
+                          <a:effectLst/>
+                        </a:rPr>
+                        <a:t> </a:t>
+                      </a:r>
+                      <a:r>
+                        <a:rPr lang="en-US" sz="1600" dirty="0" err="1">
+                          <a:effectLst/>
+                        </a:rPr>
+                        <a:t>analýza</a:t>
+                      </a:r>
+                      <a:r>
+                        <a:rPr lang="en-US" sz="1600" dirty="0">
+                          <a:effectLst/>
+                        </a:rPr>
+                        <a:t> a </a:t>
+                      </a:r>
+                      <a:r>
+                        <a:rPr lang="en-US" sz="1600" dirty="0" err="1">
+                          <a:effectLst/>
+                        </a:rPr>
+                        <a:t>reakce</a:t>
+                      </a:r>
+                      <a:endParaRPr lang="en-US" sz="1600" dirty="0">
+                        <a:effectLst/>
+                      </a:endParaRPr>
+                    </a:p>
+                  </a:txBody>
+                  <a:tcPr anchor="ctr"/>
+                </a:tc>
+                <a:tc>
+                  <a:txBody>
+                    <a:bodyPr/>
+                    <a:lstStyle/>
+                    <a:p>
+                      <a:pPr fontAlgn="base"/>
+                      <a:r>
                         <a:rPr lang="pl-PL" sz="1600" dirty="0">
                           <a:effectLst/>
                         </a:rPr>
-                        <a:t>Závisí na konfiguraci, podpora velkých sítí</a:t>
+                        <a:t>Závisí na konfiguraci</a:t>
                       </a:r>
                     </a:p>
                   </a:txBody>
@@ -2219,12 +2274,12 @@
                     <a:p>
                       <a:pPr fontAlgn="base"/>
                       <a:r>
-                        <a:rPr lang="en-US" sz="1600" b="1">
+                        <a:rPr lang="en-US" sz="1600" b="1" dirty="0" err="1">
                           <a:effectLst/>
                         </a:rPr>
                         <a:t>Kompatibilita</a:t>
                       </a:r>
-                      <a:endParaRPr lang="en-US" sz="1600">
+                      <a:endParaRPr lang="en-US" sz="1600" dirty="0">
                         <a:effectLst/>
                       </a:endParaRPr>
                     </a:p>
@@ -2322,12 +2377,24 @@
                     <a:p>
                       <a:pPr fontAlgn="base"/>
                       <a:r>
-                        <a:rPr lang="en-US" sz="1600" b="1">
+                        <a:rPr lang="en-US" sz="1600" b="1" dirty="0" err="1">
                           <a:effectLst/>
                         </a:rPr>
-                        <a:t>Uživatelská přívětivost</a:t>
-                      </a:r>
-                      <a:endParaRPr lang="en-US" sz="1600">
+                        <a:t>Uživatelská</a:t>
+                      </a:r>
+                      <a:r>
+                        <a:rPr lang="en-US" sz="1600" b="1" dirty="0">
+                          <a:effectLst/>
+                        </a:rPr>
+                        <a:t> </a:t>
+                      </a:r>
+                      <a:r>
+                        <a:rPr lang="en-US" sz="1600" b="1" dirty="0" err="1">
+                          <a:effectLst/>
+                        </a:rPr>
+                        <a:t>přívětivost</a:t>
+                      </a:r>
+                      <a:endParaRPr lang="en-US" sz="1600" dirty="0">
                         <a:effectLst/>
                       </a:endParaRPr>
                     </a:p>
@@ -2422,12 +2489,12 @@
                     <a:p>
                       <a:pPr fontAlgn="base"/>
                       <a:r>
-                        <a:rPr lang="en-US" sz="1600" b="1">
+                        <a:rPr lang="en-US" sz="1600" b="1" dirty="0" err="1">
                           <a:effectLst/>
                         </a:rPr>
                         <a:t>Rozšířitelnost</a:t>
                       </a:r>
-                      <a:endParaRPr lang="en-US" sz="1600">
+                      <a:endParaRPr lang="en-US" sz="1600" dirty="0">
                         <a:effectLst/>
                       </a:endParaRPr>
                     </a:p>
@@ -2540,12 +2607,12 @@
                     <a:p>
                       <a:pPr fontAlgn="base"/>
                       <a:r>
-                        <a:rPr lang="en-US" sz="1600" b="1">
+                        <a:rPr lang="en-US" sz="1600" b="1" dirty="0" err="1">
                           <a:effectLst/>
                         </a:rPr>
                         <a:t>Náklady</a:t>
                       </a:r>
-                      <a:endParaRPr lang="en-US" sz="1600">
+                      <a:endParaRPr lang="en-US" sz="1600" dirty="0">
                         <a:effectLst/>
                       </a:endParaRPr>
                     </a:p>
@@ -2847,7 +2914,18 @@
               <a:rPr lang="cs-CZ" dirty="0"/>
               <a:t>Komplexní řešení s pokročilou analýzou a ML pro identifikaci anomálií a hrozeb</a:t>
             </a:r>
-            <a:endParaRPr lang="en-US" dirty="0"/>
+            <a:r>
+              <a:rPr lang="en-US" dirty="0"/>
+              <a:t>. </a:t>
+            </a:r>
+            <a:r>
+              <a:rPr lang="cs-CZ" dirty="0"/>
+              <a:t> Nastavení detekce pro pokročilé vytrvalé hrozby</a:t>
+            </a:r>
+            <a:r>
+              <a:rPr lang="en-US" dirty="0"/>
+              <a:t>(APT)</a:t>
+            </a:r>
           </a:p>
           <a:p>
             <a:endParaRPr lang="en-US" dirty="0"/>
@@ -2948,14 +3026,35 @@
         <p:spPr>
           <a:xfrm>
             <a:off x="1071611" y="2367878"/>
-            <a:ext cx="7736693" cy="3376264"/>
+            <a:ext cx="7736693" cy="3814808"/>
           </a:xfrm>
         </p:spPr>
         <p:txBody>
           <a:bodyPr/>
           <a:lstStyle/>
           <a:p>
-            <a:endParaRPr lang="cs-CZ" dirty="0"/>
+            <a:r>
+              <a:rPr lang="cs-CZ" b="0" dirty="0"/>
+              <a:t>Identifikace bezpečnostních potřeb: Rozumějte specifikům a rizikům vaší sítě.</a:t>
+            </a:r>
+          </a:p>
+          <a:p>
+            <a:r>
+              <a:rPr lang="cs-CZ" b="0" dirty="0"/>
+              <a:t>Výběr řešení: Rozhodněte mezi cloud/integrovanými nebo flexibilními/on-premise možnostmi.</a:t>
+            </a:r>
+          </a:p>
+          <a:p>
+            <a:r>
+              <a:rPr lang="cs-CZ" b="0" dirty="0"/>
+              <a:t>Školení týmu: Zajistěte, že váš bezpečnostní tým je připraven a informován.</a:t>
+            </a:r>
+          </a:p>
+          <a:p>
+            <a:r>
+              <a:rPr lang="cs-CZ" b="0" dirty="0"/>
+              <a:t>Vytvoření testovacího prostředí: Otestujte funkčnost a konfiguraci v bezpečném prostředí.</a:t>
+            </a:r>
           </a:p>
         </p:txBody>
       </p:sp>
@@ -2977,7 +3076,13 @@
   <p:cSld>
     <p:spTree>
       <p:nvGrpSpPr>
-        <p:cNvPr id="1" name=""/>
+        <p:cNvPr id="1" name="">
+          <a:extLst>
+            <a:ext uri="{FF2B5EF4-FFF2-40B4-BE49-F238E27FC236}">
+              <a16:creationId xmlns:a16="http://schemas.microsoft.com/office/drawing/2014/main" id="{E09302C4-528F-85AA-AB17-795EAA7782E7}"/>
+            </a:ext>
+          </a:extLst>
+        </p:cNvPr>
         <p:cNvGrpSpPr/>
         <p:nvPr/>
       </p:nvGrpSpPr>
@@ -2994,7 +3099,7 @@
           <p:cNvPr id="2" name="Title 1">
             <a:extLst>
               <a:ext uri="{FF2B5EF4-FFF2-40B4-BE49-F238E27FC236}">
-                <a16:creationId xmlns:a16="http://schemas.microsoft.com/office/drawing/2014/main" id="{DE398BEB-BDBA-4AA8-B063-B235014F954E}"/>
+                <a16:creationId xmlns:a16="http://schemas.microsoft.com/office/drawing/2014/main" id="{2391D173-D8C4-81C2-37DF-2FA1D39D7963}"/>
               </a:ext>
             </a:extLst>
           </p:cNvPr>
@@ -3017,7 +3122,7 @@
           <a:p>
             <a:r>
               <a:rPr lang="cs-CZ" dirty="0"/>
-              <a:t>Závěr</a:t>
+              <a:t>Doporučení pro implementaci</a:t>
             </a:r>
           </a:p>
         </p:txBody>
@@ -3027,7 +3132,7 @@
           <p:cNvPr id="3" name="Subtitle 2">
             <a:extLst>
               <a:ext uri="{FF2B5EF4-FFF2-40B4-BE49-F238E27FC236}">
-                <a16:creationId xmlns:a16="http://schemas.microsoft.com/office/drawing/2014/main" id="{D7D22888-2695-1B13-7044-CBFE6CCD7732}"/>
+                <a16:creationId xmlns:a16="http://schemas.microsoft.com/office/drawing/2014/main" id="{38997983-6ABB-AE5B-AFA1-F6C0DF904B0D}"/>
               </a:ext>
             </a:extLst>
           </p:cNvPr>
@@ -3038,19 +3143,58 @@
             <p:ph type="subTitle" idx="1"/>
           </p:nvPr>
         </p:nvSpPr>
-        <p:spPr/>
+        <p:spPr>
+          <a:xfrm>
+            <a:off x="1071611" y="2367878"/>
+            <a:ext cx="7736693" cy="3814808"/>
+          </a:xfrm>
+        </p:spPr>
         <p:txBody>
-          <a:bodyPr/>
+          <a:bodyPr>
+            <a:normAutofit lnSpcReduction="10000"/>
+          </a:bodyPr>
           <a:lstStyle/>
           <a:p>
-            <a:endParaRPr lang="cs-CZ" dirty="0"/>
+            <a:r>
+              <a:rPr lang="cs-CZ" b="0" dirty="0"/>
+              <a:t>Postupné nasazení: Začněte s nejdůležitějšími částmi sítě</a:t>
+            </a:r>
+          </a:p>
+          <a:p>
+            <a:r>
+              <a:rPr lang="cs-CZ" b="0" dirty="0"/>
+              <a:t>Optimalizace nastavení: Přizpůsobte konfigurace vašim bezpečnostním potřebám</a:t>
+            </a:r>
+          </a:p>
+          <a:p>
+            <a:r>
+              <a:rPr lang="cs-CZ" b="0" dirty="0"/>
+              <a:t>Hladká integrace: Zajistěte kompatibilitu mezi NDR a ostatními bezpečnostními systémy</a:t>
+            </a:r>
+          </a:p>
+          <a:p>
+            <a:r>
+              <a:rPr lang="cs-CZ" b="0" dirty="0"/>
+              <a:t>Pravidelné monitorování: Sledujte výkon vašeho řešení a pravidelně aktualizujte politiky</a:t>
+            </a:r>
+          </a:p>
+          <a:p>
+            <a:r>
+              <a:rPr lang="cs-CZ" b="0" dirty="0"/>
+              <a:t>Plány na reakci: Mějte připravené a otestované procedury pro rychlou reakci </a:t>
+            </a:r>
+            <a:r>
+              <a:rPr lang="cs-CZ" b="0"/>
+              <a:t>na incidenty</a:t>
+            </a:r>
+            <a:endParaRPr lang="cs-CZ" b="0" dirty="0"/>
           </a:p>
         </p:txBody>
       </p:sp>
     </p:spTree>
     <p:extLst>
       <p:ext uri="{BB962C8B-B14F-4D97-AF65-F5344CB8AC3E}">
-        <p14:creationId xmlns:p14="http://schemas.microsoft.com/office/powerpoint/2010/main" val="3181247577"/>
+        <p14:creationId xmlns:p14="http://schemas.microsoft.com/office/powerpoint/2010/main" val="1975769724"/>
       </p:ext>
     </p:extLst>
   </p:cSld>
@@ -3095,6 +3239,94 @@
         </p:nvSpPr>
         <p:spPr>
           <a:xfrm>
+            <a:off x="2127565" y="921215"/>
+            <a:ext cx="7736694" cy="1446663"/>
+          </a:xfrm>
+        </p:spPr>
+        <p:txBody>
+          <a:bodyPr/>
+          <a:lstStyle/>
+          <a:p>
+            <a:r>
+              <a:rPr lang="cs-CZ" dirty="0"/>
+              <a:t>Závěr</a:t>
+            </a:r>
+          </a:p>
+        </p:txBody>
+      </p:sp>
+      <p:sp>
+        <p:nvSpPr>
+          <p:cNvPr id="3" name="Subtitle 2">
+            <a:extLst>
+              <a:ext uri="{FF2B5EF4-FFF2-40B4-BE49-F238E27FC236}">
+                <a16:creationId xmlns:a16="http://schemas.microsoft.com/office/drawing/2014/main" id="{D7D22888-2695-1B13-7044-CBFE6CCD7732}"/>
+              </a:ext>
+            </a:extLst>
+          </p:cNvPr>
+          <p:cNvSpPr>
+            <a:spLocks noGrp="1"/>
+          </p:cNvSpPr>
+          <p:nvPr>
+            <p:ph type="subTitle" idx="1"/>
+          </p:nvPr>
+        </p:nvSpPr>
+        <p:spPr/>
+        <p:txBody>
+          <a:bodyPr/>
+          <a:lstStyle/>
+          <a:p>
+            <a:endParaRPr lang="cs-CZ" dirty="0"/>
+          </a:p>
+        </p:txBody>
+      </p:sp>
+    </p:spTree>
+    <p:extLst>
+      <p:ext uri="{BB962C8B-B14F-4D97-AF65-F5344CB8AC3E}">
+        <p14:creationId xmlns:p14="http://schemas.microsoft.com/office/powerpoint/2010/main" val="3181247577"/>
+      </p:ext>
+    </p:extLst>
+  </p:cSld>
+  <p:clrMapOvr>
+    <a:masterClrMapping/>
+  </p:clrMapOvr>
+</p:sld>
+</file>
+
+<file path=ppt/slides/slide16.xml><?xml version="1.0" encoding="utf-8"?>
+<p:sld xmlns:a="http://schemas.openxmlformats.org/drawingml/2006/main" xmlns:r="http://schemas.openxmlformats.org/officeDocument/2006/relationships" xmlns:p="http://schemas.openxmlformats.org/presentationml/2006/main">
+  <p:cSld>
+    <p:spTree>
+      <p:nvGrpSpPr>
+        <p:cNvPr id="1" name=""/>
+        <p:cNvGrpSpPr/>
+        <p:nvPr/>
+      </p:nvGrpSpPr>
+      <p:grpSpPr>
+        <a:xfrm>
+          <a:off x="0" y="0"/>
+          <a:ext cx="0" cy="0"/>
+          <a:chOff x="0" y="0"/>
+          <a:chExt cx="0" cy="0"/>
+        </a:xfrm>
+      </p:grpSpPr>
+      <p:sp>
+        <p:nvSpPr>
+          <p:cNvPr id="2" name="Title 1">
+            <a:extLst>
+              <a:ext uri="{FF2B5EF4-FFF2-40B4-BE49-F238E27FC236}">
+                <a16:creationId xmlns:a16="http://schemas.microsoft.com/office/drawing/2014/main" id="{DE398BEB-BDBA-4AA8-B063-B235014F954E}"/>
+              </a:ext>
+            </a:extLst>
+          </p:cNvPr>
+          <p:cNvSpPr>
+            <a:spLocks noGrp="1"/>
+          </p:cNvSpPr>
+          <p:nvPr>
+            <p:ph type="ctrTitle"/>
+          </p:nvPr>
+        </p:nvSpPr>
+        <p:spPr>
+          <a:xfrm>
             <a:off x="1520982" y="2705668"/>
             <a:ext cx="6102036" cy="1446663"/>
           </a:xfrm>
@@ -3123,7 +3355,7 @@
 </p:sld>
 </file>
 
-<file path=ppt/slides/slide16.xml><?xml version="1.0" encoding="utf-8"?>
+<file path=ppt/slides/slide17.xml><?xml version="1.0" encoding="utf-8"?>
 <p:sld xmlns:a="http://schemas.openxmlformats.org/drawingml/2006/main" xmlns:r="http://schemas.openxmlformats.org/officeDocument/2006/relationships" xmlns:p="http://schemas.openxmlformats.org/presentationml/2006/main">
   <p:cSld>
     <p:spTree>

</xml_diff>

<commit_message>
Changed README.md and finishing present
</commit_message>
<xml_diff>
--- a/kochanek_ndr_prezentace.pptx
+++ b/kochanek_ndr_prezentace.pptx
@@ -226,7 +226,7 @@
           <a:p>
             <a:fld id="{67A3E889-99E7-42EC-985C-BC92F6F1474B}" type="datetimeFigureOut">
               <a:rPr lang="cs-CZ" smtClean="0"/>
-              <a:t>04.02.2024</a:t>
+              <a:t>05.02.2024</a:t>
             </a:fld>
             <a:endParaRPr lang="cs-CZ"/>
           </a:p>
@@ -3035,7 +3035,7 @@
           <a:p>
             <a:r>
               <a:rPr lang="cs-CZ" b="0" dirty="0"/>
-              <a:t>Identifikace bezpečnostních potřeb: Rozumějte specifikům a rizikům vaší sítě.</a:t>
+              <a:t>Identifikace bezpečnostních potřeb: Rozumějte specifikaci a rizikům vaší sítě.</a:t>
             </a:r>
           </a:p>
           <a:p>
@@ -3145,13 +3145,13 @@
         </p:nvSpPr>
         <p:spPr>
           <a:xfrm>
-            <a:off x="1071611" y="2367878"/>
-            <a:ext cx="7736693" cy="3814808"/>
+            <a:off x="1071611" y="2367877"/>
+            <a:ext cx="7736693" cy="4603373"/>
           </a:xfrm>
         </p:spPr>
         <p:txBody>
           <a:bodyPr>
-            <a:normAutofit lnSpcReduction="10000"/>
+            <a:normAutofit/>
           </a:bodyPr>
           <a:lstStyle/>
           <a:p>
@@ -3177,17 +3177,6 @@
               <a:rPr lang="cs-CZ" b="0" dirty="0"/>
               <a:t>Pravidelné monitorování: Sledujte výkon vašeho řešení a pravidelně aktualizujte politiky</a:t>
             </a:r>
-          </a:p>
-          <a:p>
-            <a:r>
-              <a:rPr lang="cs-CZ" b="0" dirty="0"/>
-              <a:t>Plány na reakci: Mějte připravené a otestované procedury pro rychlou reakci </a:t>
-            </a:r>
-            <a:r>
-              <a:rPr lang="cs-CZ" b="0"/>
-              <a:t>na incidenty</a:t>
-            </a:r>
-            <a:endParaRPr lang="cs-CZ" b="0" dirty="0"/>
           </a:p>
         </p:txBody>
       </p:sp>
@@ -3270,10 +3259,21 @@
             <p:ph type="subTitle" idx="1"/>
           </p:nvPr>
         </p:nvSpPr>
-        <p:spPr/>
+        <p:spPr>
+          <a:xfrm>
+            <a:off x="1080000" y="1853968"/>
+            <a:ext cx="7736694" cy="3359486"/>
+          </a:xfrm>
+        </p:spPr>
         <p:txBody>
           <a:bodyPr/>
           <a:lstStyle/>
+          <a:p>
+            <a:r>
+              <a:rPr lang="cs-CZ" dirty="0"/>
+              <a:t>Tento projekt mi dovolil se více zaměřit na důležité aspekty kybernetické bezpečnosti v počítačových sítích</a:t>
+            </a:r>
+          </a:p>
           <a:p>
             <a:endParaRPr lang="cs-CZ" dirty="0"/>
           </a:p>
@@ -4398,6 +4398,22 @@
               <a:rPr lang="cs-CZ" dirty="0"/>
               <a:t>- Komerční řešení NDR</a:t>
             </a:r>
+            <a:endParaRPr lang="en-US" dirty="0"/>
+          </a:p>
+          <a:p>
+            <a:r>
+              <a:rPr lang="en-US" dirty="0"/>
+              <a:t>- </a:t>
+            </a:r>
+            <a:r>
+              <a:rPr lang="en-US" dirty="0" err="1"/>
+              <a:t>Porovn</a:t>
+            </a:r>
+            <a:r>
+              <a:rPr lang="cs-CZ" dirty="0" err="1"/>
+              <a:t>ání</a:t>
+            </a:r>
+            <a:endParaRPr lang="cs-CZ" dirty="0"/>
           </a:p>
           <a:p>
             <a:r>

</xml_diff>

<commit_message>
presentation presented and done
</commit_message>
<xml_diff>
--- a/kochanek_ndr_prezentace.pptx
+++ b/kochanek_ndr_prezentace.pptx
@@ -3274,23 +3274,13 @@
               <a:t>V</a:t>
             </a:r>
             <a:r>
-              <a:rPr lang="cs-CZ" dirty="0" err="1"/>
-              <a:t>šechny</a:t>
-            </a:r>
-            <a:r>
               <a:rPr lang="cs-CZ" dirty="0"/>
-              <a:t> vytyčené mnou vytyčené cíle jsem splnil</a:t>
+              <a:t>šechny cíle, které jsem si vytyčil, jsem splnil</a:t>
             </a:r>
             <a:endParaRPr lang="en-US" dirty="0"/>
           </a:p>
           <a:p>
             <a:endParaRPr lang="en-US" dirty="0"/>
-          </a:p>
-          <a:p>
-            <a:r>
-              <a:rPr lang="cs-CZ" dirty="0"/>
-              <a:t>Díky projektu jsem se mohl zaměřit na významnou oblast kybernetické bezpečnosti.</a:t>
-            </a:r>
           </a:p>
           <a:p>
             <a:endParaRPr lang="cs-CZ" dirty="0"/>

</xml_diff>